<commit_message>
Updated the code and the presentation to become more accurate
</commit_message>
<xml_diff>
--- a/Optimization Problem Formulation.pptx
+++ b/Optimization Problem Formulation.pptx
@@ -16,14 +16,17 @@
     <p:sldId id="264" r:id="rId10"/>
     <p:sldId id="265" r:id="rId11"/>
     <p:sldId id="266" r:id="rId12"/>
-    <p:sldId id="267" r:id="rId13"/>
-    <p:sldId id="268" r:id="rId14"/>
-    <p:sldId id="269" r:id="rId15"/>
-    <p:sldId id="270" r:id="rId16"/>
-    <p:sldId id="271" r:id="rId17"/>
-    <p:sldId id="272" r:id="rId18"/>
-    <p:sldId id="273" r:id="rId19"/>
-    <p:sldId id="274" r:id="rId20"/>
+    <p:sldId id="275" r:id="rId13"/>
+    <p:sldId id="276" r:id="rId14"/>
+    <p:sldId id="277" r:id="rId15"/>
+    <p:sldId id="267" r:id="rId16"/>
+    <p:sldId id="268" r:id="rId17"/>
+    <p:sldId id="269" r:id="rId18"/>
+    <p:sldId id="270" r:id="rId19"/>
+    <p:sldId id="271" r:id="rId20"/>
+    <p:sldId id="272" r:id="rId21"/>
+    <p:sldId id="273" r:id="rId22"/>
+    <p:sldId id="274" r:id="rId23"/>
   </p:sldIdLst>
   <p:sldSz cx="12192000" cy="6858000"/>
   <p:notesSz cx="6858000" cy="9144000"/>
@@ -277,7 +280,7 @@
           <a:p>
             <a:fld id="{51A3F26F-C402-4322-946D-54B5BE03C1B0}" type="datetimeFigureOut">
               <a:rPr lang="en-US" smtClean="0"/>
-              <a:t>11/12/2024</a:t>
+              <a:t>11/13/2024</a:t>
             </a:fld>
             <a:endParaRPr lang="en-US"/>
           </a:p>
@@ -475,7 +478,7 @@
           <a:p>
             <a:fld id="{51A3F26F-C402-4322-946D-54B5BE03C1B0}" type="datetimeFigureOut">
               <a:rPr lang="en-US" smtClean="0"/>
-              <a:t>11/12/2024</a:t>
+              <a:t>11/13/2024</a:t>
             </a:fld>
             <a:endParaRPr lang="en-US"/>
           </a:p>
@@ -683,7 +686,7 @@
           <a:p>
             <a:fld id="{51A3F26F-C402-4322-946D-54B5BE03C1B0}" type="datetimeFigureOut">
               <a:rPr lang="en-US" smtClean="0"/>
-              <a:t>11/12/2024</a:t>
+              <a:t>11/13/2024</a:t>
             </a:fld>
             <a:endParaRPr lang="en-US"/>
           </a:p>
@@ -881,7 +884,7 @@
           <a:p>
             <a:fld id="{51A3F26F-C402-4322-946D-54B5BE03C1B0}" type="datetimeFigureOut">
               <a:rPr lang="en-US" smtClean="0"/>
-              <a:t>11/12/2024</a:t>
+              <a:t>11/13/2024</a:t>
             </a:fld>
             <a:endParaRPr lang="en-US"/>
           </a:p>
@@ -1156,7 +1159,7 @@
           <a:p>
             <a:fld id="{51A3F26F-C402-4322-946D-54B5BE03C1B0}" type="datetimeFigureOut">
               <a:rPr lang="en-US" smtClean="0"/>
-              <a:t>11/12/2024</a:t>
+              <a:t>11/13/2024</a:t>
             </a:fld>
             <a:endParaRPr lang="en-US"/>
           </a:p>
@@ -1421,7 +1424,7 @@
           <a:p>
             <a:fld id="{51A3F26F-C402-4322-946D-54B5BE03C1B0}" type="datetimeFigureOut">
               <a:rPr lang="en-US" smtClean="0"/>
-              <a:t>11/12/2024</a:t>
+              <a:t>11/13/2024</a:t>
             </a:fld>
             <a:endParaRPr lang="en-US"/>
           </a:p>
@@ -1833,7 +1836,7 @@
           <a:p>
             <a:fld id="{51A3F26F-C402-4322-946D-54B5BE03C1B0}" type="datetimeFigureOut">
               <a:rPr lang="en-US" smtClean="0"/>
-              <a:t>11/12/2024</a:t>
+              <a:t>11/13/2024</a:t>
             </a:fld>
             <a:endParaRPr lang="en-US"/>
           </a:p>
@@ -1974,7 +1977,7 @@
           <a:p>
             <a:fld id="{51A3F26F-C402-4322-946D-54B5BE03C1B0}" type="datetimeFigureOut">
               <a:rPr lang="en-US" smtClean="0"/>
-              <a:t>11/12/2024</a:t>
+              <a:t>11/13/2024</a:t>
             </a:fld>
             <a:endParaRPr lang="en-US"/>
           </a:p>
@@ -2087,7 +2090,7 @@
           <a:p>
             <a:fld id="{51A3F26F-C402-4322-946D-54B5BE03C1B0}" type="datetimeFigureOut">
               <a:rPr lang="en-US" smtClean="0"/>
-              <a:t>11/12/2024</a:t>
+              <a:t>11/13/2024</a:t>
             </a:fld>
             <a:endParaRPr lang="en-US"/>
           </a:p>
@@ -2398,7 +2401,7 @@
           <a:p>
             <a:fld id="{51A3F26F-C402-4322-946D-54B5BE03C1B0}" type="datetimeFigureOut">
               <a:rPr lang="en-US" smtClean="0"/>
-              <a:t>11/12/2024</a:t>
+              <a:t>11/13/2024</a:t>
             </a:fld>
             <a:endParaRPr lang="en-US"/>
           </a:p>
@@ -2686,7 +2689,7 @@
           <a:p>
             <a:fld id="{51A3F26F-C402-4322-946D-54B5BE03C1B0}" type="datetimeFigureOut">
               <a:rPr lang="en-US" smtClean="0"/>
-              <a:t>11/12/2024</a:t>
+              <a:t>11/13/2024</a:t>
             </a:fld>
             <a:endParaRPr lang="en-US"/>
           </a:p>
@@ -2927,7 +2930,7 @@
           <a:p>
             <a:fld id="{51A3F26F-C402-4322-946D-54B5BE03C1B0}" type="datetimeFigureOut">
               <a:rPr lang="en-US" smtClean="0"/>
-              <a:t>11/12/2024</a:t>
+              <a:t>11/13/2024</a:t>
             </a:fld>
             <a:endParaRPr lang="en-US"/>
           </a:p>
@@ -3878,7 +3881,7 @@
                           <a:latin typeface="Cambria Math" panose="02040503050406030204" pitchFamily="18" charset="0"/>
                           <a:cs typeface="Times New Roman" panose="02020603050405020304" pitchFamily="18" charset="0"/>
                         </a:rPr>
-                        <m:t>≤</m:t>
+                        <m:t>=</m:t>
                       </m:r>
                       <m:r>
                         <a:rPr lang="en-US" b="0" i="1" smtClean="0">
@@ -4015,7 +4018,7 @@
                           <a:latin typeface="Cambria Math" panose="02040503050406030204" pitchFamily="18" charset="0"/>
                           <a:cs typeface="Times New Roman" panose="02020603050405020304" pitchFamily="18" charset="0"/>
                         </a:rPr>
-                        <m:t>≤</m:t>
+                        <m:t>=</m:t>
                       </m:r>
                       <m:r>
                         <a:rPr lang="en-US" b="0" i="1" smtClean="0">
@@ -4413,28 +4416,7 @@
                           <a:latin typeface="Cambria Math" panose="02040503050406030204" pitchFamily="18" charset="0"/>
                           <a:cs typeface="Times New Roman" panose="02020603050405020304" pitchFamily="18" charset="0"/>
                         </a:rPr>
-                        <m:t>=</m:t>
-                      </m:r>
-                      <m:r>
-                        <a:rPr lang="en-US" sz="2400" i="1">
-                          <a:latin typeface="Cambria Math" panose="02040503050406030204" pitchFamily="18" charset="0"/>
-                          <a:cs typeface="Times New Roman" panose="02020603050405020304" pitchFamily="18" charset="0"/>
-                        </a:rPr>
-                        <m:t>0</m:t>
-                      </m:r>
-                      <m:r>
-                        <a:rPr lang="en-US" sz="2400" i="1">
-                          <a:latin typeface="Cambria Math" panose="02040503050406030204" pitchFamily="18" charset="0"/>
-                          <a:cs typeface="Times New Roman" panose="02020603050405020304" pitchFamily="18" charset="0"/>
-                        </a:rPr>
-                        <m:t>.</m:t>
-                      </m:r>
-                      <m:r>
-                        <a:rPr lang="en-US" sz="2400" i="1">
-                          <a:latin typeface="Cambria Math" panose="02040503050406030204" pitchFamily="18" charset="0"/>
-                          <a:cs typeface="Times New Roman" panose="02020603050405020304" pitchFamily="18" charset="0"/>
-                        </a:rPr>
-                        <m:t>6</m:t>
+                        <m:t>=0.6</m:t>
                       </m:r>
                       <m:sSub>
                         <m:sSubPr>
@@ -4469,28 +4451,7 @@
                           <a:latin typeface="Cambria Math" panose="02040503050406030204" pitchFamily="18" charset="0"/>
                           <a:cs typeface="Times New Roman" panose="02020603050405020304" pitchFamily="18" charset="0"/>
                         </a:rPr>
-                        <m:t>+</m:t>
-                      </m:r>
-                      <m:r>
-                        <a:rPr lang="en-US" sz="2400" i="1">
-                          <a:latin typeface="Cambria Math" panose="02040503050406030204" pitchFamily="18" charset="0"/>
-                          <a:cs typeface="Times New Roman" panose="02020603050405020304" pitchFamily="18" charset="0"/>
-                        </a:rPr>
-                        <m:t>0</m:t>
-                      </m:r>
-                      <m:r>
-                        <a:rPr lang="en-US" sz="2400" i="1">
-                          <a:latin typeface="Cambria Math" panose="02040503050406030204" pitchFamily="18" charset="0"/>
-                          <a:cs typeface="Times New Roman" panose="02020603050405020304" pitchFamily="18" charset="0"/>
-                        </a:rPr>
-                        <m:t>.</m:t>
-                      </m:r>
-                      <m:r>
-                        <a:rPr lang="en-US" sz="2400" i="1">
-                          <a:latin typeface="Cambria Math" panose="02040503050406030204" pitchFamily="18" charset="0"/>
-                          <a:cs typeface="Times New Roman" panose="02020603050405020304" pitchFamily="18" charset="0"/>
-                        </a:rPr>
-                        <m:t>5</m:t>
+                        <m:t>+0.5</m:t>
                       </m:r>
                       <m:sSub>
                         <m:sSubPr>
@@ -4555,21 +4516,7 @@
                           <a:latin typeface="Cambria Math" panose="02040503050406030204" pitchFamily="18" charset="0"/>
                           <a:cs typeface="Times New Roman" panose="02020603050405020304" pitchFamily="18" charset="0"/>
                         </a:rPr>
-                        <m:t>0</m:t>
-                      </m:r>
-                      <m:r>
-                        <a:rPr lang="en-US" sz="2400" i="1">
-                          <a:latin typeface="Cambria Math" panose="02040503050406030204" pitchFamily="18" charset="0"/>
-                          <a:cs typeface="Times New Roman" panose="02020603050405020304" pitchFamily="18" charset="0"/>
-                        </a:rPr>
-                        <m:t>.</m:t>
-                      </m:r>
-                      <m:r>
-                        <a:rPr lang="en-US" sz="2400" i="1">
-                          <a:latin typeface="Cambria Math" panose="02040503050406030204" pitchFamily="18" charset="0"/>
-                          <a:cs typeface="Times New Roman" panose="02020603050405020304" pitchFamily="18" charset="0"/>
-                        </a:rPr>
-                        <m:t>3</m:t>
+                        <m:t>0.3</m:t>
                       </m:r>
                       <m:sSub>
                         <m:sSubPr>
@@ -4604,28 +4551,7 @@
                           <a:latin typeface="Cambria Math" panose="02040503050406030204" pitchFamily="18" charset="0"/>
                           <a:cs typeface="Times New Roman" panose="02020603050405020304" pitchFamily="18" charset="0"/>
                         </a:rPr>
-                        <m:t>+</m:t>
-                      </m:r>
-                      <m:r>
-                        <a:rPr lang="en-US" sz="2400" i="1">
-                          <a:latin typeface="Cambria Math" panose="02040503050406030204" pitchFamily="18" charset="0"/>
-                          <a:cs typeface="Times New Roman" panose="02020603050405020304" pitchFamily="18" charset="0"/>
-                        </a:rPr>
-                        <m:t>0</m:t>
-                      </m:r>
-                      <m:r>
-                        <a:rPr lang="en-US" sz="2400" i="1">
-                          <a:latin typeface="Cambria Math" panose="02040503050406030204" pitchFamily="18" charset="0"/>
-                          <a:cs typeface="Times New Roman" panose="02020603050405020304" pitchFamily="18" charset="0"/>
-                        </a:rPr>
-                        <m:t>.</m:t>
-                      </m:r>
-                      <m:r>
-                        <a:rPr lang="en-US" sz="2400" i="1">
-                          <a:latin typeface="Cambria Math" panose="02040503050406030204" pitchFamily="18" charset="0"/>
-                          <a:cs typeface="Times New Roman" panose="02020603050405020304" pitchFamily="18" charset="0"/>
-                        </a:rPr>
-                        <m:t>6</m:t>
+                        <m:t>+0.6</m:t>
                       </m:r>
                       <m:sSub>
                         <m:sSubPr>
@@ -4656,11 +4582,11 @@
                         </m:sub>
                       </m:sSub>
                       <m:r>
-                        <a:rPr lang="en-US" sz="2400" i="1">
-                          <a:latin typeface="Cambria Math" panose="02040503050406030204" pitchFamily="18" charset="0"/>
-                          <a:cs typeface="Times New Roman" panose="02020603050405020304" pitchFamily="18" charset="0"/>
-                        </a:rPr>
-                        <m:t>≤</m:t>
+                        <a:rPr lang="en-US" sz="2400" b="0" i="1" smtClean="0">
+                          <a:latin typeface="Cambria Math" panose="02040503050406030204" pitchFamily="18" charset="0"/>
+                          <a:cs typeface="Times New Roman" panose="02020603050405020304" pitchFamily="18" charset="0"/>
+                        </a:rPr>
+                        <m:t>=</m:t>
                       </m:r>
                       <m:r>
                         <a:rPr lang="en-US" sz="2400" i="1">
@@ -4692,21 +4618,7 @@
                           <a:latin typeface="Cambria Math" panose="02040503050406030204" pitchFamily="18" charset="0"/>
                           <a:cs typeface="Times New Roman" panose="02020603050405020304" pitchFamily="18" charset="0"/>
                         </a:rPr>
-                        <m:t>0</m:t>
-                      </m:r>
-                      <m:r>
-                        <a:rPr lang="en-US" sz="2400" i="1">
-                          <a:latin typeface="Cambria Math" panose="02040503050406030204" pitchFamily="18" charset="0"/>
-                          <a:cs typeface="Times New Roman" panose="02020603050405020304" pitchFamily="18" charset="0"/>
-                        </a:rPr>
-                        <m:t>.</m:t>
-                      </m:r>
-                      <m:r>
-                        <a:rPr lang="en-US" sz="2400" i="1">
-                          <a:latin typeface="Cambria Math" panose="02040503050406030204" pitchFamily="18" charset="0"/>
-                          <a:cs typeface="Times New Roman" panose="02020603050405020304" pitchFamily="18" charset="0"/>
-                        </a:rPr>
-                        <m:t>7</m:t>
+                        <m:t>0.7</m:t>
                       </m:r>
                       <m:sSub>
                         <m:sSubPr>
@@ -4741,28 +4653,7 @@
                           <a:latin typeface="Cambria Math" panose="02040503050406030204" pitchFamily="18" charset="0"/>
                           <a:cs typeface="Times New Roman" panose="02020603050405020304" pitchFamily="18" charset="0"/>
                         </a:rPr>
-                        <m:t>+</m:t>
-                      </m:r>
-                      <m:r>
-                        <a:rPr lang="en-US" sz="2400" i="1">
-                          <a:latin typeface="Cambria Math" panose="02040503050406030204" pitchFamily="18" charset="0"/>
-                          <a:cs typeface="Times New Roman" panose="02020603050405020304" pitchFamily="18" charset="0"/>
-                        </a:rPr>
-                        <m:t>0</m:t>
-                      </m:r>
-                      <m:r>
-                        <a:rPr lang="en-US" sz="2400" i="1">
-                          <a:latin typeface="Cambria Math" panose="02040503050406030204" pitchFamily="18" charset="0"/>
-                          <a:cs typeface="Times New Roman" panose="02020603050405020304" pitchFamily="18" charset="0"/>
-                        </a:rPr>
-                        <m:t>.</m:t>
-                      </m:r>
-                      <m:r>
-                        <a:rPr lang="en-US" sz="2400" i="1">
-                          <a:latin typeface="Cambria Math" panose="02040503050406030204" pitchFamily="18" charset="0"/>
-                          <a:cs typeface="Times New Roman" panose="02020603050405020304" pitchFamily="18" charset="0"/>
-                        </a:rPr>
-                        <m:t>4</m:t>
+                        <m:t>+0.4</m:t>
                       </m:r>
                       <m:sSub>
                         <m:sSubPr>
@@ -4793,11 +4684,11 @@
                         </m:sub>
                       </m:sSub>
                       <m:r>
-                        <a:rPr lang="en-US" sz="2400" i="1">
-                          <a:latin typeface="Cambria Math" panose="02040503050406030204" pitchFamily="18" charset="0"/>
-                          <a:cs typeface="Times New Roman" panose="02020603050405020304" pitchFamily="18" charset="0"/>
-                        </a:rPr>
-                        <m:t>≤</m:t>
+                        <a:rPr lang="en-US" sz="2400" b="0" i="1" smtClean="0">
+                          <a:latin typeface="Cambria Math" panose="02040503050406030204" pitchFamily="18" charset="0"/>
+                          <a:cs typeface="Times New Roman" panose="02020603050405020304" pitchFamily="18" charset="0"/>
+                        </a:rPr>
+                        <m:t>=</m:t>
                       </m:r>
                       <m:r>
                         <a:rPr lang="en-US" sz="2400" i="1">
@@ -4857,14 +4748,7 @@
                           <a:latin typeface="Cambria Math" panose="02040503050406030204" pitchFamily="18" charset="0"/>
                           <a:cs typeface="Times New Roman" panose="02020603050405020304" pitchFamily="18" charset="0"/>
                         </a:rPr>
-                        <m:t>≥</m:t>
-                      </m:r>
-                      <m:r>
-                        <a:rPr lang="en-US" sz="2400" i="1">
-                          <a:latin typeface="Cambria Math" panose="02040503050406030204" pitchFamily="18" charset="0"/>
-                          <a:cs typeface="Times New Roman" panose="02020603050405020304" pitchFamily="18" charset="0"/>
-                        </a:rPr>
-                        <m:t>0</m:t>
+                        <m:t>≥0</m:t>
                       </m:r>
                     </m:oMath>
                   </m:oMathPara>
@@ -4917,14 +4801,7 @@
                           <a:latin typeface="Cambria Math" panose="02040503050406030204" pitchFamily="18" charset="0"/>
                           <a:cs typeface="Times New Roman" panose="02020603050405020304" pitchFamily="18" charset="0"/>
                         </a:rPr>
-                        <m:t>≥</m:t>
-                      </m:r>
-                      <m:r>
-                        <a:rPr lang="en-US" sz="2400" i="1">
-                          <a:latin typeface="Cambria Math" panose="02040503050406030204" pitchFamily="18" charset="0"/>
-                          <a:cs typeface="Times New Roman" panose="02020603050405020304" pitchFamily="18" charset="0"/>
-                        </a:rPr>
-                        <m:t>0</m:t>
+                        <m:t>≥0</m:t>
                       </m:r>
                     </m:oMath>
                   </m:oMathPara>
@@ -4989,35 +4866,7 @@
                           <a:latin typeface="Cambria Math" panose="02040503050406030204" pitchFamily="18" charset="0"/>
                           <a:cs typeface="Times New Roman" panose="02020603050405020304" pitchFamily="18" charset="0"/>
                         </a:rPr>
-                        <m:t>=</m:t>
-                      </m:r>
-                      <m:r>
-                        <a:rPr lang="en-US" sz="2400" b="0" i="1" smtClean="0">
-                          <a:latin typeface="Cambria Math" panose="02040503050406030204" pitchFamily="18" charset="0"/>
-                          <a:cs typeface="Times New Roman" panose="02020603050405020304" pitchFamily="18" charset="0"/>
-                        </a:rPr>
-                        <m:t>1666</m:t>
-                      </m:r>
-                      <m:r>
-                        <a:rPr lang="en-US" sz="2400" b="0" i="1" smtClean="0">
-                          <a:latin typeface="Cambria Math" panose="02040503050406030204" pitchFamily="18" charset="0"/>
-                          <a:cs typeface="Times New Roman" panose="02020603050405020304" pitchFamily="18" charset="0"/>
-                        </a:rPr>
-                        <m:t>.</m:t>
-                      </m:r>
-                      <m:r>
-                        <a:rPr lang="en-US" sz="2400" b="0" i="1" smtClean="0">
-                          <a:latin typeface="Cambria Math" panose="02040503050406030204" pitchFamily="18" charset="0"/>
-                          <a:cs typeface="Times New Roman" panose="02020603050405020304" pitchFamily="18" charset="0"/>
-                        </a:rPr>
-                        <m:t>6667</m:t>
-                      </m:r>
-                      <m:r>
-                        <a:rPr lang="en-US" sz="2400" b="0" i="1" smtClean="0">
-                          <a:latin typeface="Cambria Math" panose="02040503050406030204" pitchFamily="18" charset="0"/>
-                          <a:cs typeface="Times New Roman" panose="02020603050405020304" pitchFamily="18" charset="0"/>
-                        </a:rPr>
-                        <m:t>, </m:t>
+                        <m:t>=1666.6667, </m:t>
                       </m:r>
                       <m:sSub>
                         <m:sSubPr>
@@ -5052,28 +4901,7 @@
                           <a:latin typeface="Cambria Math" panose="02040503050406030204" pitchFamily="18" charset="0"/>
                           <a:cs typeface="Times New Roman" panose="02020603050405020304" pitchFamily="18" charset="0"/>
                         </a:rPr>
-                        <m:t>=</m:t>
-                      </m:r>
-                      <m:r>
-                        <a:rPr lang="en-US" sz="2400" b="0" i="1" smtClean="0">
-                          <a:latin typeface="Cambria Math" panose="02040503050406030204" pitchFamily="18" charset="0"/>
-                          <a:cs typeface="Times New Roman" panose="02020603050405020304" pitchFamily="18" charset="0"/>
-                        </a:rPr>
-                        <m:t>833</m:t>
-                      </m:r>
-                      <m:r>
-                        <a:rPr lang="en-US" sz="2400" b="0" i="1" smtClean="0">
-                          <a:latin typeface="Cambria Math" panose="02040503050406030204" pitchFamily="18" charset="0"/>
-                          <a:cs typeface="Times New Roman" panose="02020603050405020304" pitchFamily="18" charset="0"/>
-                        </a:rPr>
-                        <m:t>.</m:t>
-                      </m:r>
-                      <m:r>
-                        <a:rPr lang="en-US" sz="2400" b="0" i="1" smtClean="0">
-                          <a:latin typeface="Cambria Math" panose="02040503050406030204" pitchFamily="18" charset="0"/>
-                          <a:cs typeface="Times New Roman" panose="02020603050405020304" pitchFamily="18" charset="0"/>
-                        </a:rPr>
-                        <m:t>333</m:t>
+                        <m:t>=833.333</m:t>
                       </m:r>
                     </m:oMath>
                   </m:oMathPara>
@@ -5161,6 +4989,1481 @@
           <p:cNvPr id="2" name="Title 1">
             <a:extLst>
               <a:ext uri="{FF2B5EF4-FFF2-40B4-BE49-F238E27FC236}">
+                <a16:creationId xmlns:a16="http://schemas.microsoft.com/office/drawing/2014/main" id="{59FA3A63-5FE2-4BAC-9AC5-F0CEE3FC4B51}"/>
+              </a:ext>
+            </a:extLst>
+          </p:cNvPr>
+          <p:cNvSpPr>
+            <a:spLocks noGrp="1"/>
+          </p:cNvSpPr>
+          <p:nvPr>
+            <p:ph type="title"/>
+          </p:nvPr>
+        </p:nvSpPr>
+        <p:spPr/>
+        <p:txBody>
+          <a:bodyPr/>
+          <a:lstStyle/>
+          <a:p>
+            <a:r>
+              <a:rPr lang="en-US" dirty="0">
+                <a:latin typeface="Times New Roman" panose="02020603050405020304" pitchFamily="18" charset="0"/>
+                <a:cs typeface="Times New Roman" panose="02020603050405020304" pitchFamily="18" charset="0"/>
+              </a:rPr>
+              <a:t>Problem 3</a:t>
+            </a:r>
+          </a:p>
+        </p:txBody>
+      </p:sp>
+      <p:sp>
+        <p:nvSpPr>
+          <p:cNvPr id="3" name="Content Placeholder 2">
+            <a:extLst>
+              <a:ext uri="{FF2B5EF4-FFF2-40B4-BE49-F238E27FC236}">
+                <a16:creationId xmlns:a16="http://schemas.microsoft.com/office/drawing/2014/main" id="{4203F47D-906B-4A99-A26E-1DA27A935BD9}"/>
+              </a:ext>
+            </a:extLst>
+          </p:cNvPr>
+          <p:cNvSpPr>
+            <a:spLocks noGrp="1"/>
+          </p:cNvSpPr>
+          <p:nvPr>
+            <p:ph idx="1"/>
+          </p:nvPr>
+        </p:nvSpPr>
+        <p:spPr/>
+        <p:txBody>
+          <a:bodyPr/>
+          <a:lstStyle/>
+          <a:p>
+            <a:pPr marL="0" indent="0">
+              <a:buNone/>
+            </a:pPr>
+            <a:r>
+              <a:rPr lang="en-US" dirty="0">
+                <a:latin typeface="Times New Roman" panose="02020603050405020304" pitchFamily="18" charset="0"/>
+                <a:cs typeface="Times New Roman" panose="02020603050405020304" pitchFamily="18" charset="0"/>
+              </a:rPr>
+              <a:t>A store wants to liquidate 200 shirts and 100 pairs of pants from last season. They have decided to put together two offers, A and B. Offer A is a package of one shirt and a pair of pants which will sell for 30. Offer B is a package of three shirts and a pair of pants, which will sell for 50. The store does not want to sell less than 20 packages of offer A and less than 10 of offer B. How many packages of each do they have to deal to maximize the money generated from the promotion?</a:t>
+            </a:r>
+          </a:p>
+          <a:p>
+            <a:pPr marL="0" indent="0">
+              <a:buNone/>
+            </a:pPr>
+            <a:endParaRPr lang="en-US" dirty="0">
+              <a:latin typeface="Times New Roman" panose="02020603050405020304" pitchFamily="18" charset="0"/>
+              <a:cs typeface="Times New Roman" panose="02020603050405020304" pitchFamily="18" charset="0"/>
+            </a:endParaRPr>
+          </a:p>
+        </p:txBody>
+      </p:sp>
+    </p:spTree>
+    <p:extLst>
+      <p:ext uri="{BB962C8B-B14F-4D97-AF65-F5344CB8AC3E}">
+        <p14:creationId xmlns:p14="http://schemas.microsoft.com/office/powerpoint/2010/main" val="2317317997"/>
+      </p:ext>
+    </p:extLst>
+  </p:cSld>
+  <p:clrMapOvr>
+    <a:masterClrMapping/>
+  </p:clrMapOvr>
+</p:sld>
+</file>
+
+<file path=ppt/slides/slide13.xml><?xml version="1.0" encoding="utf-8"?>
+<p:sld xmlns:a="http://schemas.openxmlformats.org/drawingml/2006/main" xmlns:r="http://schemas.openxmlformats.org/officeDocument/2006/relationships" xmlns:p="http://schemas.openxmlformats.org/presentationml/2006/main">
+  <p:cSld>
+    <p:spTree>
+      <p:nvGrpSpPr>
+        <p:cNvPr id="1" name=""/>
+        <p:cNvGrpSpPr/>
+        <p:nvPr/>
+      </p:nvGrpSpPr>
+      <p:grpSpPr>
+        <a:xfrm>
+          <a:off x="0" y="0"/>
+          <a:ext cx="0" cy="0"/>
+          <a:chOff x="0" y="0"/>
+          <a:chExt cx="0" cy="0"/>
+        </a:xfrm>
+      </p:grpSpPr>
+      <p:sp>
+        <p:nvSpPr>
+          <p:cNvPr id="2" name="Title 1">
+            <a:extLst>
+              <a:ext uri="{FF2B5EF4-FFF2-40B4-BE49-F238E27FC236}">
+                <a16:creationId xmlns:a16="http://schemas.microsoft.com/office/drawing/2014/main" id="{0F8E9437-E05F-4A63-AFD6-A68A7358D88E}"/>
+              </a:ext>
+            </a:extLst>
+          </p:cNvPr>
+          <p:cNvSpPr>
+            <a:spLocks noGrp="1"/>
+          </p:cNvSpPr>
+          <p:nvPr>
+            <p:ph type="title"/>
+          </p:nvPr>
+        </p:nvSpPr>
+        <p:spPr/>
+        <p:txBody>
+          <a:bodyPr/>
+          <a:lstStyle/>
+          <a:p>
+            <a:r>
+              <a:rPr lang="en-US" dirty="0">
+                <a:latin typeface="Times New Roman" panose="02020603050405020304" pitchFamily="18" charset="0"/>
+                <a:cs typeface="Times New Roman" panose="02020603050405020304" pitchFamily="18" charset="0"/>
+              </a:rPr>
+              <a:t>Problem 3</a:t>
+            </a:r>
+          </a:p>
+        </p:txBody>
+      </p:sp>
+      <mc:AlternateContent xmlns:mc="http://schemas.openxmlformats.org/markup-compatibility/2006">
+        <mc:Choice xmlns:a14="http://schemas.microsoft.com/office/drawing/2010/main" Requires="a14">
+          <p:sp>
+            <p:nvSpPr>
+              <p:cNvPr id="3" name="Content Placeholder 2">
+                <a:extLst>
+                  <a:ext uri="{FF2B5EF4-FFF2-40B4-BE49-F238E27FC236}">
+                    <a16:creationId xmlns:a16="http://schemas.microsoft.com/office/drawing/2014/main" id="{1DEBE683-FE6D-406A-A388-6C56FCBC1933}"/>
+                  </a:ext>
+                </a:extLst>
+              </p:cNvPr>
+              <p:cNvSpPr>
+                <a:spLocks noGrp="1"/>
+              </p:cNvSpPr>
+              <p:nvPr>
+                <p:ph idx="1"/>
+              </p:nvPr>
+            </p:nvSpPr>
+            <p:spPr/>
+            <p:txBody>
+              <a:bodyPr/>
+              <a:lstStyle/>
+              <a:p>
+                <a:pPr marL="0" indent="0">
+                  <a:buNone/>
+                </a:pPr>
+                <a:r>
+                  <a:rPr lang="en-US" dirty="0">
+                    <a:latin typeface="Times New Roman" panose="02020603050405020304" pitchFamily="18" charset="0"/>
+                    <a:cs typeface="Times New Roman" panose="02020603050405020304" pitchFamily="18" charset="0"/>
+                  </a:rPr>
+                  <a:t>It is required to find the number of offers of each type that will maximize the profit. Therefore, the objective function is:</a:t>
+                </a:r>
+              </a:p>
+              <a:p>
+                <a:pPr marL="0" indent="0" algn="ctr">
+                  <a:buNone/>
+                </a:pPr>
+                <a14:m>
+                  <m:oMathPara xmlns:m="http://schemas.openxmlformats.org/officeDocument/2006/math">
+                    <m:oMathParaPr>
+                      <m:jc m:val="centerGroup"/>
+                    </m:oMathParaPr>
+                    <m:oMath xmlns:m="http://schemas.openxmlformats.org/officeDocument/2006/math">
+                      <m:r>
+                        <a:rPr lang="en-US" b="0" i="1" smtClean="0">
+                          <a:latin typeface="Cambria Math" panose="02040503050406030204" pitchFamily="18" charset="0"/>
+                          <a:cs typeface="Times New Roman" panose="02020603050405020304" pitchFamily="18" charset="0"/>
+                        </a:rPr>
+                        <m:t>𝑓</m:t>
+                      </m:r>
+                      <m:d>
+                        <m:dPr>
+                          <m:ctrlPr>
+                            <a:rPr lang="en-US" b="0" i="1" smtClean="0">
+                              <a:latin typeface="Cambria Math" panose="02040503050406030204" pitchFamily="18" charset="0"/>
+                              <a:cs typeface="Times New Roman" panose="02020603050405020304" pitchFamily="18" charset="0"/>
+                            </a:rPr>
+                          </m:ctrlPr>
+                        </m:dPr>
+                        <m:e>
+                          <m:sSub>
+                            <m:sSubPr>
+                              <m:ctrlPr>
+                                <a:rPr lang="en-US" b="0" i="1" smtClean="0">
+                                  <a:latin typeface="Cambria Math" panose="02040503050406030204" pitchFamily="18" charset="0"/>
+                                  <a:cs typeface="Times New Roman" panose="02020603050405020304" pitchFamily="18" charset="0"/>
+                                </a:rPr>
+                              </m:ctrlPr>
+                            </m:sSubPr>
+                            <m:e>
+                              <m:r>
+                                <a:rPr lang="en-US" b="0" i="1" smtClean="0">
+                                  <a:latin typeface="Cambria Math" panose="02040503050406030204" pitchFamily="18" charset="0"/>
+                                  <a:cs typeface="Times New Roman" panose="02020603050405020304" pitchFamily="18" charset="0"/>
+                                </a:rPr>
+                                <m:t>𝑥</m:t>
+                              </m:r>
+                            </m:e>
+                            <m:sub>
+                              <m:r>
+                                <a:rPr lang="en-US" b="0" i="1" smtClean="0">
+                                  <a:latin typeface="Cambria Math" panose="02040503050406030204" pitchFamily="18" charset="0"/>
+                                  <a:cs typeface="Times New Roman" panose="02020603050405020304" pitchFamily="18" charset="0"/>
+                                </a:rPr>
+                                <m:t>1</m:t>
+                              </m:r>
+                            </m:sub>
+                          </m:sSub>
+                          <m:r>
+                            <a:rPr lang="en-US" b="0" i="1" smtClean="0">
+                              <a:latin typeface="Cambria Math" panose="02040503050406030204" pitchFamily="18" charset="0"/>
+                              <a:cs typeface="Times New Roman" panose="02020603050405020304" pitchFamily="18" charset="0"/>
+                            </a:rPr>
+                            <m:t>, </m:t>
+                          </m:r>
+                          <m:sSub>
+                            <m:sSubPr>
+                              <m:ctrlPr>
+                                <a:rPr lang="en-US" b="0" i="1" smtClean="0">
+                                  <a:latin typeface="Cambria Math" panose="02040503050406030204" pitchFamily="18" charset="0"/>
+                                  <a:cs typeface="Times New Roman" panose="02020603050405020304" pitchFamily="18" charset="0"/>
+                                </a:rPr>
+                              </m:ctrlPr>
+                            </m:sSubPr>
+                            <m:e>
+                              <m:r>
+                                <a:rPr lang="en-US" b="0" i="1" smtClean="0">
+                                  <a:latin typeface="Cambria Math" panose="02040503050406030204" pitchFamily="18" charset="0"/>
+                                  <a:cs typeface="Times New Roman" panose="02020603050405020304" pitchFamily="18" charset="0"/>
+                                </a:rPr>
+                                <m:t>𝑥</m:t>
+                              </m:r>
+                            </m:e>
+                            <m:sub>
+                              <m:r>
+                                <a:rPr lang="en-US" b="0" i="1" smtClean="0">
+                                  <a:latin typeface="Cambria Math" panose="02040503050406030204" pitchFamily="18" charset="0"/>
+                                  <a:cs typeface="Times New Roman" panose="02020603050405020304" pitchFamily="18" charset="0"/>
+                                </a:rPr>
+                                <m:t>2</m:t>
+                              </m:r>
+                            </m:sub>
+                          </m:sSub>
+                        </m:e>
+                      </m:d>
+                      <m:r>
+                        <a:rPr lang="en-US" b="0" i="1" smtClean="0">
+                          <a:latin typeface="Cambria Math" panose="02040503050406030204" pitchFamily="18" charset="0"/>
+                          <a:cs typeface="Times New Roman" panose="02020603050405020304" pitchFamily="18" charset="0"/>
+                        </a:rPr>
+                        <m:t>=30</m:t>
+                      </m:r>
+                      <m:sSub>
+                        <m:sSubPr>
+                          <m:ctrlPr>
+                            <a:rPr lang="en-US" b="0" i="1" smtClean="0">
+                              <a:latin typeface="Cambria Math" panose="02040503050406030204" pitchFamily="18" charset="0"/>
+                              <a:cs typeface="Times New Roman" panose="02020603050405020304" pitchFamily="18" charset="0"/>
+                            </a:rPr>
+                          </m:ctrlPr>
+                        </m:sSubPr>
+                        <m:e>
+                          <m:r>
+                            <a:rPr lang="en-US" b="0" i="1" smtClean="0">
+                              <a:latin typeface="Cambria Math" panose="02040503050406030204" pitchFamily="18" charset="0"/>
+                              <a:cs typeface="Times New Roman" panose="02020603050405020304" pitchFamily="18" charset="0"/>
+                            </a:rPr>
+                            <m:t>𝑥</m:t>
+                          </m:r>
+                        </m:e>
+                        <m:sub>
+                          <m:r>
+                            <a:rPr lang="en-US" b="0" i="1" smtClean="0">
+                              <a:latin typeface="Cambria Math" panose="02040503050406030204" pitchFamily="18" charset="0"/>
+                              <a:cs typeface="Times New Roman" panose="02020603050405020304" pitchFamily="18" charset="0"/>
+                            </a:rPr>
+                            <m:t>1</m:t>
+                          </m:r>
+                        </m:sub>
+                      </m:sSub>
+                      <m:r>
+                        <a:rPr lang="en-US" b="0" i="1" smtClean="0">
+                          <a:latin typeface="Cambria Math" panose="02040503050406030204" pitchFamily="18" charset="0"/>
+                          <a:cs typeface="Times New Roman" panose="02020603050405020304" pitchFamily="18" charset="0"/>
+                        </a:rPr>
+                        <m:t>+50</m:t>
+                      </m:r>
+                      <m:sSub>
+                        <m:sSubPr>
+                          <m:ctrlPr>
+                            <a:rPr lang="en-US" b="0" i="1" smtClean="0">
+                              <a:latin typeface="Cambria Math" panose="02040503050406030204" pitchFamily="18" charset="0"/>
+                              <a:cs typeface="Times New Roman" panose="02020603050405020304" pitchFamily="18" charset="0"/>
+                            </a:rPr>
+                          </m:ctrlPr>
+                        </m:sSubPr>
+                        <m:e>
+                          <m:r>
+                            <a:rPr lang="en-US" b="0" i="1" smtClean="0">
+                              <a:latin typeface="Cambria Math" panose="02040503050406030204" pitchFamily="18" charset="0"/>
+                              <a:cs typeface="Times New Roman" panose="02020603050405020304" pitchFamily="18" charset="0"/>
+                            </a:rPr>
+                            <m:t>𝑥</m:t>
+                          </m:r>
+                        </m:e>
+                        <m:sub>
+                          <m:r>
+                            <a:rPr lang="en-US" b="0" i="1" smtClean="0">
+                              <a:latin typeface="Cambria Math" panose="02040503050406030204" pitchFamily="18" charset="0"/>
+                              <a:cs typeface="Times New Roman" panose="02020603050405020304" pitchFamily="18" charset="0"/>
+                            </a:rPr>
+                            <m:t>2</m:t>
+                          </m:r>
+                        </m:sub>
+                      </m:sSub>
+                    </m:oMath>
+                  </m:oMathPara>
+                </a14:m>
+                <a:endParaRPr lang="en-US" dirty="0">
+                  <a:latin typeface="Times New Roman" panose="02020603050405020304" pitchFamily="18" charset="0"/>
+                  <a:cs typeface="Times New Roman" panose="02020603050405020304" pitchFamily="18" charset="0"/>
+                </a:endParaRPr>
+              </a:p>
+              <a:p>
+                <a:pPr marL="0" indent="0">
+                  <a:buNone/>
+                </a:pPr>
+                <a:r>
+                  <a:rPr lang="en-US" dirty="0">
+                    <a:latin typeface="Times New Roman" panose="02020603050405020304" pitchFamily="18" charset="0"/>
+                    <a:cs typeface="Times New Roman" panose="02020603050405020304" pitchFamily="18" charset="0"/>
+                  </a:rPr>
+                  <a:t> Offers A and B provide one pair of pants each. Therefore:</a:t>
+                </a:r>
+              </a:p>
+              <a:p>
+                <a:pPr marL="0" indent="0">
+                  <a:buNone/>
+                </a:pPr>
+                <a14:m>
+                  <m:oMathPara xmlns:m="http://schemas.openxmlformats.org/officeDocument/2006/math">
+                    <m:oMathParaPr>
+                      <m:jc m:val="centerGroup"/>
+                    </m:oMathParaPr>
+                    <m:oMath xmlns:m="http://schemas.openxmlformats.org/officeDocument/2006/math">
+                      <m:sSub>
+                        <m:sSubPr>
+                          <m:ctrlPr>
+                            <a:rPr lang="en-US" b="0" i="1" smtClean="0">
+                              <a:latin typeface="Cambria Math" panose="02040503050406030204" pitchFamily="18" charset="0"/>
+                              <a:cs typeface="Times New Roman" panose="02020603050405020304" pitchFamily="18" charset="0"/>
+                            </a:rPr>
+                          </m:ctrlPr>
+                        </m:sSubPr>
+                        <m:e>
+                          <m:r>
+                            <a:rPr lang="en-US" b="0" i="1" smtClean="0">
+                              <a:latin typeface="Cambria Math" panose="02040503050406030204" pitchFamily="18" charset="0"/>
+                              <a:cs typeface="Times New Roman" panose="02020603050405020304" pitchFamily="18" charset="0"/>
+                            </a:rPr>
+                            <m:t>𝑥</m:t>
+                          </m:r>
+                        </m:e>
+                        <m:sub>
+                          <m:r>
+                            <a:rPr lang="en-US" b="0" i="1" smtClean="0">
+                              <a:latin typeface="Cambria Math" panose="02040503050406030204" pitchFamily="18" charset="0"/>
+                              <a:cs typeface="Times New Roman" panose="02020603050405020304" pitchFamily="18" charset="0"/>
+                            </a:rPr>
+                            <m:t>1</m:t>
+                          </m:r>
+                        </m:sub>
+                      </m:sSub>
+                      <m:r>
+                        <a:rPr lang="en-US" b="0" i="1" smtClean="0">
+                          <a:latin typeface="Cambria Math" panose="02040503050406030204" pitchFamily="18" charset="0"/>
+                          <a:cs typeface="Times New Roman" panose="02020603050405020304" pitchFamily="18" charset="0"/>
+                        </a:rPr>
+                        <m:t>+</m:t>
+                      </m:r>
+                      <m:sSub>
+                        <m:sSubPr>
+                          <m:ctrlPr>
+                            <a:rPr lang="en-US" b="0" i="1" smtClean="0">
+                              <a:latin typeface="Cambria Math" panose="02040503050406030204" pitchFamily="18" charset="0"/>
+                              <a:cs typeface="Times New Roman" panose="02020603050405020304" pitchFamily="18" charset="0"/>
+                            </a:rPr>
+                          </m:ctrlPr>
+                        </m:sSubPr>
+                        <m:e>
+                          <m:r>
+                            <a:rPr lang="en-US" b="0" i="1" smtClean="0">
+                              <a:latin typeface="Cambria Math" panose="02040503050406030204" pitchFamily="18" charset="0"/>
+                              <a:cs typeface="Times New Roman" panose="02020603050405020304" pitchFamily="18" charset="0"/>
+                            </a:rPr>
+                            <m:t>𝑥</m:t>
+                          </m:r>
+                        </m:e>
+                        <m:sub>
+                          <m:r>
+                            <a:rPr lang="en-US" b="0" i="1" smtClean="0">
+                              <a:latin typeface="Cambria Math" panose="02040503050406030204" pitchFamily="18" charset="0"/>
+                              <a:cs typeface="Times New Roman" panose="02020603050405020304" pitchFamily="18" charset="0"/>
+                            </a:rPr>
+                            <m:t>2</m:t>
+                          </m:r>
+                        </m:sub>
+                      </m:sSub>
+                      <m:r>
+                        <a:rPr lang="en-US" b="0" i="1" smtClean="0">
+                          <a:latin typeface="Cambria Math" panose="02040503050406030204" pitchFamily="18" charset="0"/>
+                          <a:cs typeface="Times New Roman" panose="02020603050405020304" pitchFamily="18" charset="0"/>
+                        </a:rPr>
+                        <m:t>=100</m:t>
+                      </m:r>
+                    </m:oMath>
+                  </m:oMathPara>
+                </a14:m>
+                <a:endParaRPr lang="en-US" b="0" dirty="0">
+                  <a:latin typeface="Times New Roman" panose="02020603050405020304" pitchFamily="18" charset="0"/>
+                  <a:cs typeface="Times New Roman" panose="02020603050405020304" pitchFamily="18" charset="0"/>
+                </a:endParaRPr>
+              </a:p>
+              <a:p>
+                <a:pPr marL="0" indent="0">
+                  <a:buNone/>
+                </a:pPr>
+                <a:r>
+                  <a:rPr lang="en-US" dirty="0">
+                    <a:latin typeface="Times New Roman" panose="02020603050405020304" pitchFamily="18" charset="0"/>
+                    <a:cs typeface="Times New Roman" panose="02020603050405020304" pitchFamily="18" charset="0"/>
+                  </a:rPr>
+                  <a:t>Offers A and B provide three and one shirts, respectively. Therefore: </a:t>
+                </a:r>
+              </a:p>
+              <a:p>
+                <a:pPr marL="0" indent="0">
+                  <a:buNone/>
+                </a:pPr>
+                <a14:m>
+                  <m:oMathPara xmlns:m="http://schemas.openxmlformats.org/officeDocument/2006/math">
+                    <m:oMathParaPr>
+                      <m:jc m:val="centerGroup"/>
+                    </m:oMathParaPr>
+                    <m:oMath xmlns:m="http://schemas.openxmlformats.org/officeDocument/2006/math">
+                      <m:sSub>
+                        <m:sSubPr>
+                          <m:ctrlPr>
+                            <a:rPr lang="en-US" b="0" i="1" smtClean="0">
+                              <a:latin typeface="Cambria Math" panose="02040503050406030204" pitchFamily="18" charset="0"/>
+                              <a:cs typeface="Times New Roman" panose="02020603050405020304" pitchFamily="18" charset="0"/>
+                            </a:rPr>
+                          </m:ctrlPr>
+                        </m:sSubPr>
+                        <m:e>
+                          <m:r>
+                            <a:rPr lang="en-US" b="0" i="1" smtClean="0">
+                              <a:latin typeface="Cambria Math" panose="02040503050406030204" pitchFamily="18" charset="0"/>
+                              <a:cs typeface="Times New Roman" panose="02020603050405020304" pitchFamily="18" charset="0"/>
+                            </a:rPr>
+                            <m:t>𝑥</m:t>
+                          </m:r>
+                        </m:e>
+                        <m:sub>
+                          <m:r>
+                            <a:rPr lang="en-US" b="0" i="1" smtClean="0">
+                              <a:latin typeface="Cambria Math" panose="02040503050406030204" pitchFamily="18" charset="0"/>
+                              <a:cs typeface="Times New Roman" panose="02020603050405020304" pitchFamily="18" charset="0"/>
+                            </a:rPr>
+                            <m:t>1</m:t>
+                          </m:r>
+                        </m:sub>
+                      </m:sSub>
+                      <m:r>
+                        <a:rPr lang="en-US" b="0" i="1" smtClean="0">
+                          <a:latin typeface="Cambria Math" panose="02040503050406030204" pitchFamily="18" charset="0"/>
+                          <a:cs typeface="Times New Roman" panose="02020603050405020304" pitchFamily="18" charset="0"/>
+                        </a:rPr>
+                        <m:t>+3</m:t>
+                      </m:r>
+                      <m:sSub>
+                        <m:sSubPr>
+                          <m:ctrlPr>
+                            <a:rPr lang="en-US" b="0" i="1" smtClean="0">
+                              <a:latin typeface="Cambria Math" panose="02040503050406030204" pitchFamily="18" charset="0"/>
+                              <a:cs typeface="Times New Roman" panose="02020603050405020304" pitchFamily="18" charset="0"/>
+                            </a:rPr>
+                          </m:ctrlPr>
+                        </m:sSubPr>
+                        <m:e>
+                          <m:r>
+                            <a:rPr lang="en-US" b="0" i="1" smtClean="0">
+                              <a:latin typeface="Cambria Math" panose="02040503050406030204" pitchFamily="18" charset="0"/>
+                              <a:cs typeface="Times New Roman" panose="02020603050405020304" pitchFamily="18" charset="0"/>
+                            </a:rPr>
+                            <m:t>𝑥</m:t>
+                          </m:r>
+                        </m:e>
+                        <m:sub>
+                          <m:r>
+                            <a:rPr lang="en-US" b="0" i="1" smtClean="0">
+                              <a:latin typeface="Cambria Math" panose="02040503050406030204" pitchFamily="18" charset="0"/>
+                              <a:cs typeface="Times New Roman" panose="02020603050405020304" pitchFamily="18" charset="0"/>
+                            </a:rPr>
+                            <m:t>2</m:t>
+                          </m:r>
+                        </m:sub>
+                      </m:sSub>
+                      <m:r>
+                        <a:rPr lang="en-US" b="0" i="1" smtClean="0">
+                          <a:latin typeface="Cambria Math" panose="02040503050406030204" pitchFamily="18" charset="0"/>
+                          <a:cs typeface="Times New Roman" panose="02020603050405020304" pitchFamily="18" charset="0"/>
+                        </a:rPr>
+                        <m:t>=200</m:t>
+                      </m:r>
+                    </m:oMath>
+                  </m:oMathPara>
+                </a14:m>
+                <a:endParaRPr lang="en-US" dirty="0">
+                  <a:latin typeface="Times New Roman" panose="02020603050405020304" pitchFamily="18" charset="0"/>
+                  <a:cs typeface="Times New Roman" panose="02020603050405020304" pitchFamily="18" charset="0"/>
+                </a:endParaRPr>
+              </a:p>
+              <a:p>
+                <a:pPr marL="0" indent="0">
+                  <a:buNone/>
+                </a:pPr>
+                <a:endParaRPr lang="en-US" dirty="0">
+                  <a:latin typeface="Times New Roman" panose="02020603050405020304" pitchFamily="18" charset="0"/>
+                  <a:cs typeface="Times New Roman" panose="02020603050405020304" pitchFamily="18" charset="0"/>
+                </a:endParaRPr>
+              </a:p>
+            </p:txBody>
+          </p:sp>
+        </mc:Choice>
+        <mc:Fallback>
+          <p:sp>
+            <p:nvSpPr>
+              <p:cNvPr id="3" name="Content Placeholder 2">
+                <a:extLst>
+                  <a:ext uri="{FF2B5EF4-FFF2-40B4-BE49-F238E27FC236}">
+                    <a16:creationId xmlns:a16="http://schemas.microsoft.com/office/drawing/2014/main" id="{1DEBE683-FE6D-406A-A388-6C56FCBC1933}"/>
+                  </a:ext>
+                </a:extLst>
+              </p:cNvPr>
+              <p:cNvSpPr>
+                <a:spLocks noGrp="1" noRot="1" noChangeAspect="1" noMove="1" noResize="1" noEditPoints="1" noAdjustHandles="1" noChangeArrowheads="1" noChangeShapeType="1" noTextEdit="1"/>
+              </p:cNvSpPr>
+              <p:nvPr>
+                <p:ph idx="1"/>
+              </p:nvPr>
+            </p:nvSpPr>
+            <p:spPr>
+              <a:blipFill>
+                <a:blip r:embed="rId2"/>
+                <a:stretch>
+                  <a:fillRect l="-1217" t="-2381"/>
+                </a:stretch>
+              </a:blipFill>
+            </p:spPr>
+            <p:txBody>
+              <a:bodyPr/>
+              <a:lstStyle/>
+              <a:p>
+                <a:r>
+                  <a:rPr lang="en-US">
+                    <a:noFill/>
+                  </a:rPr>
+                  <a:t> </a:t>
+                </a:r>
+              </a:p>
+            </p:txBody>
+          </p:sp>
+        </mc:Fallback>
+      </mc:AlternateContent>
+    </p:spTree>
+    <p:extLst>
+      <p:ext uri="{BB962C8B-B14F-4D97-AF65-F5344CB8AC3E}">
+        <p14:creationId xmlns:p14="http://schemas.microsoft.com/office/powerpoint/2010/main" val="911612557"/>
+      </p:ext>
+    </p:extLst>
+  </p:cSld>
+  <p:clrMapOvr>
+    <a:masterClrMapping/>
+  </p:clrMapOvr>
+</p:sld>
+</file>
+
+<file path=ppt/slides/slide14.xml><?xml version="1.0" encoding="utf-8"?>
+<p:sld xmlns:a="http://schemas.openxmlformats.org/drawingml/2006/main" xmlns:r="http://schemas.openxmlformats.org/officeDocument/2006/relationships" xmlns:p="http://schemas.openxmlformats.org/presentationml/2006/main">
+  <p:cSld>
+    <p:spTree>
+      <p:nvGrpSpPr>
+        <p:cNvPr id="1" name=""/>
+        <p:cNvGrpSpPr/>
+        <p:nvPr/>
+      </p:nvGrpSpPr>
+      <p:grpSpPr>
+        <a:xfrm>
+          <a:off x="0" y="0"/>
+          <a:ext cx="0" cy="0"/>
+          <a:chOff x="0" y="0"/>
+          <a:chExt cx="0" cy="0"/>
+        </a:xfrm>
+      </p:grpSpPr>
+      <p:sp>
+        <p:nvSpPr>
+          <p:cNvPr id="2" name="Title 1">
+            <a:extLst>
+              <a:ext uri="{FF2B5EF4-FFF2-40B4-BE49-F238E27FC236}">
+                <a16:creationId xmlns:a16="http://schemas.microsoft.com/office/drawing/2014/main" id="{38731005-BC8A-4113-BD7B-44C8816152E0}"/>
+              </a:ext>
+            </a:extLst>
+          </p:cNvPr>
+          <p:cNvSpPr>
+            <a:spLocks noGrp="1"/>
+          </p:cNvSpPr>
+          <p:nvPr>
+            <p:ph type="title"/>
+          </p:nvPr>
+        </p:nvSpPr>
+        <p:spPr>
+          <a:xfrm>
+            <a:off x="838200" y="365126"/>
+            <a:ext cx="10515600" cy="683746"/>
+          </a:xfrm>
+        </p:spPr>
+        <p:txBody>
+          <a:bodyPr>
+            <a:normAutofit fontScale="90000"/>
+          </a:bodyPr>
+          <a:lstStyle/>
+          <a:p>
+            <a:r>
+              <a:rPr lang="en-US" dirty="0">
+                <a:latin typeface="Times New Roman" panose="02020603050405020304" pitchFamily="18" charset="0"/>
+                <a:cs typeface="Times New Roman" panose="02020603050405020304" pitchFamily="18" charset="0"/>
+              </a:rPr>
+              <a:t>Problem 3</a:t>
+            </a:r>
+          </a:p>
+        </p:txBody>
+      </p:sp>
+      <mc:AlternateContent xmlns:mc="http://schemas.openxmlformats.org/markup-compatibility/2006">
+        <mc:Choice xmlns:a14="http://schemas.microsoft.com/office/drawing/2010/main" Requires="a14">
+          <p:sp>
+            <p:nvSpPr>
+              <p:cNvPr id="3" name="Content Placeholder 2">
+                <a:extLst>
+                  <a:ext uri="{FF2B5EF4-FFF2-40B4-BE49-F238E27FC236}">
+                    <a16:creationId xmlns:a16="http://schemas.microsoft.com/office/drawing/2014/main" id="{C4F6C5E5-E100-4073-94A3-1C05542FA77A}"/>
+                  </a:ext>
+                </a:extLst>
+              </p:cNvPr>
+              <p:cNvSpPr>
+                <a:spLocks noGrp="1"/>
+              </p:cNvSpPr>
+              <p:nvPr>
+                <p:ph idx="1"/>
+              </p:nvPr>
+            </p:nvSpPr>
+            <p:spPr>
+              <a:xfrm>
+                <a:off x="838200" y="1048872"/>
+                <a:ext cx="10515600" cy="5128091"/>
+              </a:xfrm>
+            </p:spPr>
+            <p:txBody>
+              <a:bodyPr>
+                <a:normAutofit/>
+              </a:bodyPr>
+              <a:lstStyle/>
+              <a:p>
+                <a:pPr marL="0" indent="0">
+                  <a:buNone/>
+                </a:pPr>
+                <a:r>
+                  <a:rPr lang="en-US" sz="2400" dirty="0">
+                    <a:latin typeface="Times New Roman" panose="02020603050405020304" pitchFamily="18" charset="0"/>
+                    <a:cs typeface="Times New Roman" panose="02020603050405020304" pitchFamily="18" charset="0"/>
+                  </a:rPr>
+                  <a:t>Finally, the store does not want to sell less than 20 packages of offer A nor less than 10 packages of offer B. Therefore: </a:t>
+                </a:r>
+              </a:p>
+              <a:p>
+                <a:pPr marL="0" indent="0">
+                  <a:buNone/>
+                </a:pPr>
+                <a14:m>
+                  <m:oMathPara xmlns:m="http://schemas.openxmlformats.org/officeDocument/2006/math">
+                    <m:oMathParaPr>
+                      <m:jc m:val="centerGroup"/>
+                    </m:oMathParaPr>
+                    <m:oMath xmlns:m="http://schemas.openxmlformats.org/officeDocument/2006/math">
+                      <m:sSub>
+                        <m:sSubPr>
+                          <m:ctrlPr>
+                            <a:rPr lang="en-US" sz="2400" b="0" i="1" smtClean="0">
+                              <a:latin typeface="Cambria Math" panose="02040503050406030204" pitchFamily="18" charset="0"/>
+                              <a:cs typeface="Times New Roman" panose="02020603050405020304" pitchFamily="18" charset="0"/>
+                            </a:rPr>
+                          </m:ctrlPr>
+                        </m:sSubPr>
+                        <m:e>
+                          <m:r>
+                            <a:rPr lang="en-US" sz="2400" b="0" i="1" smtClean="0">
+                              <a:latin typeface="Cambria Math" panose="02040503050406030204" pitchFamily="18" charset="0"/>
+                              <a:cs typeface="Times New Roman" panose="02020603050405020304" pitchFamily="18" charset="0"/>
+                            </a:rPr>
+                            <m:t>𝑥</m:t>
+                          </m:r>
+                        </m:e>
+                        <m:sub>
+                          <m:r>
+                            <a:rPr lang="en-US" sz="2400" b="0" i="1" smtClean="0">
+                              <a:latin typeface="Cambria Math" panose="02040503050406030204" pitchFamily="18" charset="0"/>
+                              <a:cs typeface="Times New Roman" panose="02020603050405020304" pitchFamily="18" charset="0"/>
+                            </a:rPr>
+                            <m:t>1</m:t>
+                          </m:r>
+                        </m:sub>
+                      </m:sSub>
+                      <m:r>
+                        <a:rPr lang="en-US" sz="2400" b="0" i="1" smtClean="0">
+                          <a:latin typeface="Cambria Math" panose="02040503050406030204" pitchFamily="18" charset="0"/>
+                          <a:cs typeface="Times New Roman" panose="02020603050405020304" pitchFamily="18" charset="0"/>
+                        </a:rPr>
+                        <m:t>≥20</m:t>
+                      </m:r>
+                    </m:oMath>
+                  </m:oMathPara>
+                </a14:m>
+                <a:endParaRPr lang="en-US" sz="2400" b="0" dirty="0">
+                  <a:latin typeface="Times New Roman" panose="02020603050405020304" pitchFamily="18" charset="0"/>
+                  <a:cs typeface="Times New Roman" panose="02020603050405020304" pitchFamily="18" charset="0"/>
+                </a:endParaRPr>
+              </a:p>
+              <a:p>
+                <a:pPr marL="0" indent="0">
+                  <a:buNone/>
+                </a:pPr>
+                <a14:m>
+                  <m:oMathPara xmlns:m="http://schemas.openxmlformats.org/officeDocument/2006/math">
+                    <m:oMathParaPr>
+                      <m:jc m:val="centerGroup"/>
+                    </m:oMathParaPr>
+                    <m:oMath xmlns:m="http://schemas.openxmlformats.org/officeDocument/2006/math">
+                      <m:sSub>
+                        <m:sSubPr>
+                          <m:ctrlPr>
+                            <a:rPr lang="en-US" sz="2400" b="0" i="1" smtClean="0">
+                              <a:latin typeface="Cambria Math" panose="02040503050406030204" pitchFamily="18" charset="0"/>
+                              <a:cs typeface="Times New Roman" panose="02020603050405020304" pitchFamily="18" charset="0"/>
+                            </a:rPr>
+                          </m:ctrlPr>
+                        </m:sSubPr>
+                        <m:e>
+                          <m:r>
+                            <a:rPr lang="en-US" sz="2400" b="0" i="1" smtClean="0">
+                              <a:latin typeface="Cambria Math" panose="02040503050406030204" pitchFamily="18" charset="0"/>
+                              <a:cs typeface="Times New Roman" panose="02020603050405020304" pitchFamily="18" charset="0"/>
+                            </a:rPr>
+                            <m:t>𝑥</m:t>
+                          </m:r>
+                        </m:e>
+                        <m:sub>
+                          <m:r>
+                            <a:rPr lang="en-US" sz="2400" b="0" i="1" smtClean="0">
+                              <a:latin typeface="Cambria Math" panose="02040503050406030204" pitchFamily="18" charset="0"/>
+                              <a:cs typeface="Times New Roman" panose="02020603050405020304" pitchFamily="18" charset="0"/>
+                            </a:rPr>
+                            <m:t>2</m:t>
+                          </m:r>
+                        </m:sub>
+                      </m:sSub>
+                      <m:r>
+                        <a:rPr lang="en-US" sz="2400" b="0" i="1" smtClean="0">
+                          <a:latin typeface="Cambria Math" panose="02040503050406030204" pitchFamily="18" charset="0"/>
+                          <a:cs typeface="Times New Roman" panose="02020603050405020304" pitchFamily="18" charset="0"/>
+                        </a:rPr>
+                        <m:t>≥10</m:t>
+                      </m:r>
+                    </m:oMath>
+                  </m:oMathPara>
+                </a14:m>
+                <a:endParaRPr lang="en-US" sz="2400" dirty="0">
+                  <a:latin typeface="Times New Roman" panose="02020603050405020304" pitchFamily="18" charset="0"/>
+                  <a:cs typeface="Times New Roman" panose="02020603050405020304" pitchFamily="18" charset="0"/>
+                </a:endParaRPr>
+              </a:p>
+              <a:p>
+                <a:pPr marL="0" indent="0">
+                  <a:buNone/>
+                </a:pPr>
+                <a:r>
+                  <a:rPr lang="en-US" sz="2400" dirty="0">
+                    <a:latin typeface="Times New Roman" panose="02020603050405020304" pitchFamily="18" charset="0"/>
+                    <a:cs typeface="Times New Roman" panose="02020603050405020304" pitchFamily="18" charset="0"/>
+                  </a:rPr>
+                  <a:t>The problem statement is then:</a:t>
+                </a:r>
+              </a:p>
+              <a:p>
+                <a:pPr marL="0" indent="0">
+                  <a:buNone/>
+                </a:pPr>
+                <a:r>
+                  <a:rPr lang="en-US" sz="2400" dirty="0">
+                    <a:latin typeface="Times New Roman" panose="02020603050405020304" pitchFamily="18" charset="0"/>
+                    <a:cs typeface="Times New Roman" panose="02020603050405020304" pitchFamily="18" charset="0"/>
+                  </a:rPr>
+                  <a:t>Maximize:</a:t>
+                </a:r>
+              </a:p>
+              <a:p>
+                <a:pPr marL="0" indent="0">
+                  <a:buNone/>
+                </a:pPr>
+                <a14:m>
+                  <m:oMathPara xmlns:m="http://schemas.openxmlformats.org/officeDocument/2006/math">
+                    <m:oMathParaPr>
+                      <m:jc m:val="centerGroup"/>
+                    </m:oMathParaPr>
+                    <m:oMath xmlns:m="http://schemas.openxmlformats.org/officeDocument/2006/math">
+                      <m:r>
+                        <a:rPr lang="en-US" sz="2400" i="1">
+                          <a:latin typeface="Cambria Math" panose="02040503050406030204" pitchFamily="18" charset="0"/>
+                          <a:cs typeface="Times New Roman" panose="02020603050405020304" pitchFamily="18" charset="0"/>
+                        </a:rPr>
+                        <m:t>𝑓</m:t>
+                      </m:r>
+                      <m:d>
+                        <m:dPr>
+                          <m:ctrlPr>
+                            <a:rPr lang="en-US" sz="2400" i="1">
+                              <a:latin typeface="Cambria Math" panose="02040503050406030204" pitchFamily="18" charset="0"/>
+                              <a:cs typeface="Times New Roman" panose="02020603050405020304" pitchFamily="18" charset="0"/>
+                            </a:rPr>
+                          </m:ctrlPr>
+                        </m:dPr>
+                        <m:e>
+                          <m:sSub>
+                            <m:sSubPr>
+                              <m:ctrlPr>
+                                <a:rPr lang="en-US" sz="2400" i="1">
+                                  <a:latin typeface="Cambria Math" panose="02040503050406030204" pitchFamily="18" charset="0"/>
+                                  <a:cs typeface="Times New Roman" panose="02020603050405020304" pitchFamily="18" charset="0"/>
+                                </a:rPr>
+                              </m:ctrlPr>
+                            </m:sSubPr>
+                            <m:e>
+                              <m:r>
+                                <a:rPr lang="en-US" sz="2400" i="1">
+                                  <a:latin typeface="Cambria Math" panose="02040503050406030204" pitchFamily="18" charset="0"/>
+                                  <a:cs typeface="Times New Roman" panose="02020603050405020304" pitchFamily="18" charset="0"/>
+                                </a:rPr>
+                                <m:t>𝑥</m:t>
+                              </m:r>
+                            </m:e>
+                            <m:sub>
+                              <m:r>
+                                <a:rPr lang="en-US" sz="2400" i="1">
+                                  <a:latin typeface="Cambria Math" panose="02040503050406030204" pitchFamily="18" charset="0"/>
+                                  <a:cs typeface="Times New Roman" panose="02020603050405020304" pitchFamily="18" charset="0"/>
+                                </a:rPr>
+                                <m:t>1</m:t>
+                              </m:r>
+                            </m:sub>
+                          </m:sSub>
+                          <m:r>
+                            <a:rPr lang="en-US" sz="2400" i="1">
+                              <a:latin typeface="Cambria Math" panose="02040503050406030204" pitchFamily="18" charset="0"/>
+                              <a:cs typeface="Times New Roman" panose="02020603050405020304" pitchFamily="18" charset="0"/>
+                            </a:rPr>
+                            <m:t>, </m:t>
+                          </m:r>
+                          <m:sSub>
+                            <m:sSubPr>
+                              <m:ctrlPr>
+                                <a:rPr lang="en-US" sz="2400" i="1">
+                                  <a:latin typeface="Cambria Math" panose="02040503050406030204" pitchFamily="18" charset="0"/>
+                                  <a:cs typeface="Times New Roman" panose="02020603050405020304" pitchFamily="18" charset="0"/>
+                                </a:rPr>
+                              </m:ctrlPr>
+                            </m:sSubPr>
+                            <m:e>
+                              <m:r>
+                                <a:rPr lang="en-US" sz="2400" i="1">
+                                  <a:latin typeface="Cambria Math" panose="02040503050406030204" pitchFamily="18" charset="0"/>
+                                  <a:cs typeface="Times New Roman" panose="02020603050405020304" pitchFamily="18" charset="0"/>
+                                </a:rPr>
+                                <m:t>𝑥</m:t>
+                              </m:r>
+                            </m:e>
+                            <m:sub>
+                              <m:r>
+                                <a:rPr lang="en-US" sz="2400" i="1">
+                                  <a:latin typeface="Cambria Math" panose="02040503050406030204" pitchFamily="18" charset="0"/>
+                                  <a:cs typeface="Times New Roman" panose="02020603050405020304" pitchFamily="18" charset="0"/>
+                                </a:rPr>
+                                <m:t>2</m:t>
+                              </m:r>
+                            </m:sub>
+                          </m:sSub>
+                        </m:e>
+                      </m:d>
+                      <m:r>
+                        <a:rPr lang="en-US" sz="2400" i="1">
+                          <a:latin typeface="Cambria Math" panose="02040503050406030204" pitchFamily="18" charset="0"/>
+                          <a:cs typeface="Times New Roman" panose="02020603050405020304" pitchFamily="18" charset="0"/>
+                        </a:rPr>
+                        <m:t>=30</m:t>
+                      </m:r>
+                      <m:sSub>
+                        <m:sSubPr>
+                          <m:ctrlPr>
+                            <a:rPr lang="en-US" sz="2400" i="1">
+                              <a:latin typeface="Cambria Math" panose="02040503050406030204" pitchFamily="18" charset="0"/>
+                              <a:cs typeface="Times New Roman" panose="02020603050405020304" pitchFamily="18" charset="0"/>
+                            </a:rPr>
+                          </m:ctrlPr>
+                        </m:sSubPr>
+                        <m:e>
+                          <m:r>
+                            <a:rPr lang="en-US" sz="2400" i="1">
+                              <a:latin typeface="Cambria Math" panose="02040503050406030204" pitchFamily="18" charset="0"/>
+                              <a:cs typeface="Times New Roman" panose="02020603050405020304" pitchFamily="18" charset="0"/>
+                            </a:rPr>
+                            <m:t>𝑥</m:t>
+                          </m:r>
+                        </m:e>
+                        <m:sub>
+                          <m:r>
+                            <a:rPr lang="en-US" sz="2400" i="1">
+                              <a:latin typeface="Cambria Math" panose="02040503050406030204" pitchFamily="18" charset="0"/>
+                              <a:cs typeface="Times New Roman" panose="02020603050405020304" pitchFamily="18" charset="0"/>
+                            </a:rPr>
+                            <m:t>1</m:t>
+                          </m:r>
+                        </m:sub>
+                      </m:sSub>
+                      <m:r>
+                        <a:rPr lang="en-US" sz="2400" i="1">
+                          <a:latin typeface="Cambria Math" panose="02040503050406030204" pitchFamily="18" charset="0"/>
+                          <a:cs typeface="Times New Roman" panose="02020603050405020304" pitchFamily="18" charset="0"/>
+                        </a:rPr>
+                        <m:t>+50</m:t>
+                      </m:r>
+                      <m:sSub>
+                        <m:sSubPr>
+                          <m:ctrlPr>
+                            <a:rPr lang="en-US" sz="2400" i="1">
+                              <a:latin typeface="Cambria Math" panose="02040503050406030204" pitchFamily="18" charset="0"/>
+                              <a:cs typeface="Times New Roman" panose="02020603050405020304" pitchFamily="18" charset="0"/>
+                            </a:rPr>
+                          </m:ctrlPr>
+                        </m:sSubPr>
+                        <m:e>
+                          <m:r>
+                            <a:rPr lang="en-US" sz="2400" i="1">
+                              <a:latin typeface="Cambria Math" panose="02040503050406030204" pitchFamily="18" charset="0"/>
+                              <a:cs typeface="Times New Roman" panose="02020603050405020304" pitchFamily="18" charset="0"/>
+                            </a:rPr>
+                            <m:t>𝑥</m:t>
+                          </m:r>
+                        </m:e>
+                        <m:sub>
+                          <m:r>
+                            <a:rPr lang="en-US" sz="2400" i="1">
+                              <a:latin typeface="Cambria Math" panose="02040503050406030204" pitchFamily="18" charset="0"/>
+                              <a:cs typeface="Times New Roman" panose="02020603050405020304" pitchFamily="18" charset="0"/>
+                            </a:rPr>
+                            <m:t>2</m:t>
+                          </m:r>
+                        </m:sub>
+                      </m:sSub>
+                    </m:oMath>
+                  </m:oMathPara>
+                </a14:m>
+                <a:endParaRPr lang="en-US" sz="2400" dirty="0">
+                  <a:latin typeface="Times New Roman" panose="02020603050405020304" pitchFamily="18" charset="0"/>
+                  <a:cs typeface="Times New Roman" panose="02020603050405020304" pitchFamily="18" charset="0"/>
+                </a:endParaRPr>
+              </a:p>
+              <a:p>
+                <a:pPr marL="0" indent="0">
+                  <a:buNone/>
+                </a:pPr>
+                <a:r>
+                  <a:rPr lang="en-US" sz="2400" dirty="0">
+                    <a:latin typeface="Times New Roman" panose="02020603050405020304" pitchFamily="18" charset="0"/>
+                    <a:cs typeface="Times New Roman" panose="02020603050405020304" pitchFamily="18" charset="0"/>
+                  </a:rPr>
+                  <a:t>Subject to:</a:t>
+                </a:r>
+              </a:p>
+              <a:p>
+                <a:pPr marL="0" indent="0">
+                  <a:buNone/>
+                </a:pPr>
+                <a14:m>
+                  <m:oMathPara xmlns:m="http://schemas.openxmlformats.org/officeDocument/2006/math">
+                    <m:oMathParaPr>
+                      <m:jc m:val="centerGroup"/>
+                    </m:oMathParaPr>
+                    <m:oMath xmlns:m="http://schemas.openxmlformats.org/officeDocument/2006/math">
+                      <m:sSub>
+                        <m:sSubPr>
+                          <m:ctrlPr>
+                            <a:rPr lang="en-US" sz="2400" i="1">
+                              <a:latin typeface="Cambria Math" panose="02040503050406030204" pitchFamily="18" charset="0"/>
+                              <a:cs typeface="Times New Roman" panose="02020603050405020304" pitchFamily="18" charset="0"/>
+                            </a:rPr>
+                          </m:ctrlPr>
+                        </m:sSubPr>
+                        <m:e>
+                          <m:r>
+                            <a:rPr lang="en-US" sz="2400" i="1">
+                              <a:latin typeface="Cambria Math" panose="02040503050406030204" pitchFamily="18" charset="0"/>
+                              <a:cs typeface="Times New Roman" panose="02020603050405020304" pitchFamily="18" charset="0"/>
+                            </a:rPr>
+                            <m:t>𝑥</m:t>
+                          </m:r>
+                        </m:e>
+                        <m:sub>
+                          <m:r>
+                            <a:rPr lang="en-US" sz="2400" i="1">
+                              <a:latin typeface="Cambria Math" panose="02040503050406030204" pitchFamily="18" charset="0"/>
+                              <a:cs typeface="Times New Roman" panose="02020603050405020304" pitchFamily="18" charset="0"/>
+                            </a:rPr>
+                            <m:t>1</m:t>
+                          </m:r>
+                        </m:sub>
+                      </m:sSub>
+                      <m:r>
+                        <a:rPr lang="en-US" sz="2400" i="1">
+                          <a:latin typeface="Cambria Math" panose="02040503050406030204" pitchFamily="18" charset="0"/>
+                          <a:cs typeface="Times New Roman" panose="02020603050405020304" pitchFamily="18" charset="0"/>
+                        </a:rPr>
+                        <m:t>+</m:t>
+                      </m:r>
+                      <m:sSub>
+                        <m:sSubPr>
+                          <m:ctrlPr>
+                            <a:rPr lang="en-US" sz="2400" i="1">
+                              <a:latin typeface="Cambria Math" panose="02040503050406030204" pitchFamily="18" charset="0"/>
+                              <a:cs typeface="Times New Roman" panose="02020603050405020304" pitchFamily="18" charset="0"/>
+                            </a:rPr>
+                          </m:ctrlPr>
+                        </m:sSubPr>
+                        <m:e>
+                          <m:r>
+                            <a:rPr lang="en-US" sz="2400" i="1">
+                              <a:latin typeface="Cambria Math" panose="02040503050406030204" pitchFamily="18" charset="0"/>
+                              <a:cs typeface="Times New Roman" panose="02020603050405020304" pitchFamily="18" charset="0"/>
+                            </a:rPr>
+                            <m:t>𝑥</m:t>
+                          </m:r>
+                        </m:e>
+                        <m:sub>
+                          <m:r>
+                            <a:rPr lang="en-US" sz="2400" i="1">
+                              <a:latin typeface="Cambria Math" panose="02040503050406030204" pitchFamily="18" charset="0"/>
+                              <a:cs typeface="Times New Roman" panose="02020603050405020304" pitchFamily="18" charset="0"/>
+                            </a:rPr>
+                            <m:t>2</m:t>
+                          </m:r>
+                        </m:sub>
+                      </m:sSub>
+                      <m:r>
+                        <a:rPr lang="en-US" sz="2400" b="0" i="1" smtClean="0">
+                          <a:latin typeface="Cambria Math" panose="02040503050406030204" pitchFamily="18" charset="0"/>
+                          <a:cs typeface="Times New Roman" panose="02020603050405020304" pitchFamily="18" charset="0"/>
+                        </a:rPr>
+                        <m:t>=</m:t>
+                      </m:r>
+                      <m:r>
+                        <a:rPr lang="en-US" sz="2400" i="1">
+                          <a:latin typeface="Cambria Math" panose="02040503050406030204" pitchFamily="18" charset="0"/>
+                          <a:cs typeface="Times New Roman" panose="02020603050405020304" pitchFamily="18" charset="0"/>
+                        </a:rPr>
+                        <m:t>100</m:t>
+                      </m:r>
+                    </m:oMath>
+                  </m:oMathPara>
+                </a14:m>
+                <a:endParaRPr lang="en-US" sz="2400" dirty="0">
+                  <a:latin typeface="Times New Roman" panose="02020603050405020304" pitchFamily="18" charset="0"/>
+                  <a:cs typeface="Times New Roman" panose="02020603050405020304" pitchFamily="18" charset="0"/>
+                </a:endParaRPr>
+              </a:p>
+              <a:p>
+                <a:pPr marL="0" indent="0">
+                  <a:buNone/>
+                </a:pPr>
+                <a14:m>
+                  <m:oMathPara xmlns:m="http://schemas.openxmlformats.org/officeDocument/2006/math">
+                    <m:oMathParaPr>
+                      <m:jc m:val="centerGroup"/>
+                    </m:oMathParaPr>
+                    <m:oMath xmlns:m="http://schemas.openxmlformats.org/officeDocument/2006/math">
+                      <m:sSub>
+                        <m:sSubPr>
+                          <m:ctrlPr>
+                            <a:rPr lang="en-US" sz="2400" i="1">
+                              <a:latin typeface="Cambria Math" panose="02040503050406030204" pitchFamily="18" charset="0"/>
+                              <a:cs typeface="Times New Roman" panose="02020603050405020304" pitchFamily="18" charset="0"/>
+                            </a:rPr>
+                          </m:ctrlPr>
+                        </m:sSubPr>
+                        <m:e>
+                          <m:r>
+                            <a:rPr lang="en-US" sz="2400" i="1">
+                              <a:latin typeface="Cambria Math" panose="02040503050406030204" pitchFamily="18" charset="0"/>
+                              <a:cs typeface="Times New Roman" panose="02020603050405020304" pitchFamily="18" charset="0"/>
+                            </a:rPr>
+                            <m:t>𝑥</m:t>
+                          </m:r>
+                        </m:e>
+                        <m:sub>
+                          <m:r>
+                            <a:rPr lang="en-US" sz="2400" i="1">
+                              <a:latin typeface="Cambria Math" panose="02040503050406030204" pitchFamily="18" charset="0"/>
+                              <a:cs typeface="Times New Roman" panose="02020603050405020304" pitchFamily="18" charset="0"/>
+                            </a:rPr>
+                            <m:t>1</m:t>
+                          </m:r>
+                        </m:sub>
+                      </m:sSub>
+                      <m:r>
+                        <a:rPr lang="en-US" sz="2400" i="1">
+                          <a:latin typeface="Cambria Math" panose="02040503050406030204" pitchFamily="18" charset="0"/>
+                          <a:cs typeface="Times New Roman" panose="02020603050405020304" pitchFamily="18" charset="0"/>
+                        </a:rPr>
+                        <m:t>+3</m:t>
+                      </m:r>
+                      <m:sSub>
+                        <m:sSubPr>
+                          <m:ctrlPr>
+                            <a:rPr lang="en-US" sz="2400" i="1">
+                              <a:latin typeface="Cambria Math" panose="02040503050406030204" pitchFamily="18" charset="0"/>
+                              <a:cs typeface="Times New Roman" panose="02020603050405020304" pitchFamily="18" charset="0"/>
+                            </a:rPr>
+                          </m:ctrlPr>
+                        </m:sSubPr>
+                        <m:e>
+                          <m:r>
+                            <a:rPr lang="en-US" sz="2400" i="1">
+                              <a:latin typeface="Cambria Math" panose="02040503050406030204" pitchFamily="18" charset="0"/>
+                              <a:cs typeface="Times New Roman" panose="02020603050405020304" pitchFamily="18" charset="0"/>
+                            </a:rPr>
+                            <m:t>𝑥</m:t>
+                          </m:r>
+                        </m:e>
+                        <m:sub>
+                          <m:r>
+                            <a:rPr lang="en-US" sz="2400" i="1">
+                              <a:latin typeface="Cambria Math" panose="02040503050406030204" pitchFamily="18" charset="0"/>
+                              <a:cs typeface="Times New Roman" panose="02020603050405020304" pitchFamily="18" charset="0"/>
+                            </a:rPr>
+                            <m:t>2</m:t>
+                          </m:r>
+                        </m:sub>
+                      </m:sSub>
+                      <m:r>
+                        <a:rPr lang="en-US" sz="2400" b="0" i="1" smtClean="0">
+                          <a:latin typeface="Cambria Math" panose="02040503050406030204" pitchFamily="18" charset="0"/>
+                          <a:cs typeface="Times New Roman" panose="02020603050405020304" pitchFamily="18" charset="0"/>
+                        </a:rPr>
+                        <m:t>=</m:t>
+                      </m:r>
+                      <m:r>
+                        <a:rPr lang="en-US" sz="2400" i="1">
+                          <a:latin typeface="Cambria Math" panose="02040503050406030204" pitchFamily="18" charset="0"/>
+                          <a:cs typeface="Times New Roman" panose="02020603050405020304" pitchFamily="18" charset="0"/>
+                        </a:rPr>
+                        <m:t>200</m:t>
+                      </m:r>
+                    </m:oMath>
+                  </m:oMathPara>
+                </a14:m>
+                <a:endParaRPr lang="en-US" sz="2400" dirty="0">
+                  <a:latin typeface="Times New Roman" panose="02020603050405020304" pitchFamily="18" charset="0"/>
+                  <a:cs typeface="Times New Roman" panose="02020603050405020304" pitchFamily="18" charset="0"/>
+                </a:endParaRPr>
+              </a:p>
+              <a:p>
+                <a:pPr marL="0" indent="0">
+                  <a:buNone/>
+                </a:pPr>
+                <a14:m>
+                  <m:oMathPara xmlns:m="http://schemas.openxmlformats.org/officeDocument/2006/math">
+                    <m:oMathParaPr>
+                      <m:jc m:val="centerGroup"/>
+                    </m:oMathParaPr>
+                    <m:oMath xmlns:m="http://schemas.openxmlformats.org/officeDocument/2006/math">
+                      <m:sSub>
+                        <m:sSubPr>
+                          <m:ctrlPr>
+                            <a:rPr lang="en-US" sz="2400" i="1">
+                              <a:latin typeface="Cambria Math" panose="02040503050406030204" pitchFamily="18" charset="0"/>
+                              <a:cs typeface="Times New Roman" panose="02020603050405020304" pitchFamily="18" charset="0"/>
+                            </a:rPr>
+                          </m:ctrlPr>
+                        </m:sSubPr>
+                        <m:e>
+                          <m:r>
+                            <a:rPr lang="en-US" sz="2400" i="1">
+                              <a:latin typeface="Cambria Math" panose="02040503050406030204" pitchFamily="18" charset="0"/>
+                              <a:cs typeface="Times New Roman" panose="02020603050405020304" pitchFamily="18" charset="0"/>
+                            </a:rPr>
+                            <m:t>𝑥</m:t>
+                          </m:r>
+                        </m:e>
+                        <m:sub>
+                          <m:r>
+                            <a:rPr lang="en-US" sz="2400" i="1">
+                              <a:latin typeface="Cambria Math" panose="02040503050406030204" pitchFamily="18" charset="0"/>
+                              <a:cs typeface="Times New Roman" panose="02020603050405020304" pitchFamily="18" charset="0"/>
+                            </a:rPr>
+                            <m:t>1</m:t>
+                          </m:r>
+                        </m:sub>
+                      </m:sSub>
+                      <m:r>
+                        <a:rPr lang="en-US" sz="2400" i="1">
+                          <a:latin typeface="Cambria Math" panose="02040503050406030204" pitchFamily="18" charset="0"/>
+                          <a:cs typeface="Times New Roman" panose="02020603050405020304" pitchFamily="18" charset="0"/>
+                        </a:rPr>
+                        <m:t>≥20</m:t>
+                      </m:r>
+                    </m:oMath>
+                  </m:oMathPara>
+                </a14:m>
+                <a:endParaRPr lang="en-US" sz="2400" dirty="0">
+                  <a:latin typeface="Times New Roman" panose="02020603050405020304" pitchFamily="18" charset="0"/>
+                  <a:cs typeface="Times New Roman" panose="02020603050405020304" pitchFamily="18" charset="0"/>
+                </a:endParaRPr>
+              </a:p>
+              <a:p>
+                <a:pPr marL="0" indent="0">
+                  <a:buNone/>
+                </a:pPr>
+                <a14:m>
+                  <m:oMathPara xmlns:m="http://schemas.openxmlformats.org/officeDocument/2006/math">
+                    <m:oMathParaPr>
+                      <m:jc m:val="centerGroup"/>
+                    </m:oMathParaPr>
+                    <m:oMath xmlns:m="http://schemas.openxmlformats.org/officeDocument/2006/math">
+                      <m:sSub>
+                        <m:sSubPr>
+                          <m:ctrlPr>
+                            <a:rPr lang="en-US" sz="2400" i="1">
+                              <a:latin typeface="Cambria Math" panose="02040503050406030204" pitchFamily="18" charset="0"/>
+                              <a:cs typeface="Times New Roman" panose="02020603050405020304" pitchFamily="18" charset="0"/>
+                            </a:rPr>
+                          </m:ctrlPr>
+                        </m:sSubPr>
+                        <m:e>
+                          <m:r>
+                            <a:rPr lang="en-US" sz="2400" i="1">
+                              <a:latin typeface="Cambria Math" panose="02040503050406030204" pitchFamily="18" charset="0"/>
+                              <a:cs typeface="Times New Roman" panose="02020603050405020304" pitchFamily="18" charset="0"/>
+                            </a:rPr>
+                            <m:t>𝑥</m:t>
+                          </m:r>
+                        </m:e>
+                        <m:sub>
+                          <m:r>
+                            <a:rPr lang="en-US" sz="2400" i="1">
+                              <a:latin typeface="Cambria Math" panose="02040503050406030204" pitchFamily="18" charset="0"/>
+                              <a:cs typeface="Times New Roman" panose="02020603050405020304" pitchFamily="18" charset="0"/>
+                            </a:rPr>
+                            <m:t>2</m:t>
+                          </m:r>
+                        </m:sub>
+                      </m:sSub>
+                      <m:r>
+                        <a:rPr lang="en-US" sz="2400" i="1">
+                          <a:latin typeface="Cambria Math" panose="02040503050406030204" pitchFamily="18" charset="0"/>
+                          <a:cs typeface="Times New Roman" panose="02020603050405020304" pitchFamily="18" charset="0"/>
+                        </a:rPr>
+                        <m:t>≥10</m:t>
+                      </m:r>
+                    </m:oMath>
+                  </m:oMathPara>
+                </a14:m>
+                <a:endParaRPr lang="en-US" sz="2400" dirty="0">
+                  <a:latin typeface="Times New Roman" panose="02020603050405020304" pitchFamily="18" charset="0"/>
+                  <a:cs typeface="Times New Roman" panose="02020603050405020304" pitchFamily="18" charset="0"/>
+                </a:endParaRPr>
+              </a:p>
+              <a:p>
+                <a:pPr marL="0" indent="0">
+                  <a:buNone/>
+                </a:pPr>
+                <a:r>
+                  <a:rPr lang="en-US" sz="2400" dirty="0">
+                    <a:latin typeface="Times New Roman" panose="02020603050405020304" pitchFamily="18" charset="0"/>
+                    <a:cs typeface="Times New Roman" panose="02020603050405020304" pitchFamily="18" charset="0"/>
+                  </a:rPr>
+                  <a:t>The solution is: </a:t>
+                </a:r>
+                <a14:m>
+                  <m:oMath xmlns:m="http://schemas.openxmlformats.org/officeDocument/2006/math">
+                    <m:sSub>
+                      <m:sSubPr>
+                        <m:ctrlPr>
+                          <a:rPr lang="en-US" sz="2400" b="0" i="1" smtClean="0">
+                            <a:latin typeface="Cambria Math" panose="02040503050406030204" pitchFamily="18" charset="0"/>
+                            <a:cs typeface="Times New Roman" panose="02020603050405020304" pitchFamily="18" charset="0"/>
+                          </a:rPr>
+                        </m:ctrlPr>
+                      </m:sSubPr>
+                      <m:e>
+                        <m:r>
+                          <a:rPr lang="en-US" sz="2400" b="0" i="1" smtClean="0">
+                            <a:latin typeface="Cambria Math" panose="02040503050406030204" pitchFamily="18" charset="0"/>
+                            <a:cs typeface="Times New Roman" panose="02020603050405020304" pitchFamily="18" charset="0"/>
+                          </a:rPr>
+                          <m:t>𝑥</m:t>
+                        </m:r>
+                      </m:e>
+                      <m:sub>
+                        <m:r>
+                          <a:rPr lang="en-US" sz="2400" b="0" i="1" smtClean="0">
+                            <a:latin typeface="Cambria Math" panose="02040503050406030204" pitchFamily="18" charset="0"/>
+                            <a:cs typeface="Times New Roman" panose="02020603050405020304" pitchFamily="18" charset="0"/>
+                          </a:rPr>
+                          <m:t>1</m:t>
+                        </m:r>
+                      </m:sub>
+                    </m:sSub>
+                    <m:r>
+                      <a:rPr lang="en-US" sz="2400" b="0" i="1" smtClean="0">
+                        <a:latin typeface="Cambria Math" panose="02040503050406030204" pitchFamily="18" charset="0"/>
+                        <a:cs typeface="Times New Roman" panose="02020603050405020304" pitchFamily="18" charset="0"/>
+                      </a:rPr>
+                      <m:t>=50, </m:t>
+                    </m:r>
+                    <m:sSub>
+                      <m:sSubPr>
+                        <m:ctrlPr>
+                          <a:rPr lang="en-US" sz="2400" b="0" i="1" smtClean="0">
+                            <a:latin typeface="Cambria Math" panose="02040503050406030204" pitchFamily="18" charset="0"/>
+                            <a:cs typeface="Times New Roman" panose="02020603050405020304" pitchFamily="18" charset="0"/>
+                          </a:rPr>
+                        </m:ctrlPr>
+                      </m:sSubPr>
+                      <m:e>
+                        <m:r>
+                          <a:rPr lang="en-US" sz="2400" b="0" i="1" smtClean="0">
+                            <a:latin typeface="Cambria Math" panose="02040503050406030204" pitchFamily="18" charset="0"/>
+                            <a:cs typeface="Times New Roman" panose="02020603050405020304" pitchFamily="18" charset="0"/>
+                          </a:rPr>
+                          <m:t>𝑥</m:t>
+                        </m:r>
+                      </m:e>
+                      <m:sub>
+                        <m:r>
+                          <a:rPr lang="en-US" sz="2400" b="0" i="1" smtClean="0">
+                            <a:latin typeface="Cambria Math" panose="02040503050406030204" pitchFamily="18" charset="0"/>
+                            <a:cs typeface="Times New Roman" panose="02020603050405020304" pitchFamily="18" charset="0"/>
+                          </a:rPr>
+                          <m:t>2</m:t>
+                        </m:r>
+                      </m:sub>
+                    </m:sSub>
+                    <m:r>
+                      <a:rPr lang="en-US" sz="2400" b="0" i="1" smtClean="0">
+                        <a:latin typeface="Cambria Math" panose="02040503050406030204" pitchFamily="18" charset="0"/>
+                        <a:cs typeface="Times New Roman" panose="02020603050405020304" pitchFamily="18" charset="0"/>
+                      </a:rPr>
+                      <m:t>=50</m:t>
+                    </m:r>
+                  </m:oMath>
+                </a14:m>
+                <a:endParaRPr lang="en-US" sz="2400" dirty="0">
+                  <a:latin typeface="Times New Roman" panose="02020603050405020304" pitchFamily="18" charset="0"/>
+                  <a:cs typeface="Times New Roman" panose="02020603050405020304" pitchFamily="18" charset="0"/>
+                </a:endParaRPr>
+              </a:p>
+            </p:txBody>
+          </p:sp>
+        </mc:Choice>
+        <mc:Fallback>
+          <p:sp>
+            <p:nvSpPr>
+              <p:cNvPr id="3" name="Content Placeholder 2">
+                <a:extLst>
+                  <a:ext uri="{FF2B5EF4-FFF2-40B4-BE49-F238E27FC236}">
+                    <a16:creationId xmlns:a16="http://schemas.microsoft.com/office/drawing/2014/main" id="{C4F6C5E5-E100-4073-94A3-1C05542FA77A}"/>
+                  </a:ext>
+                </a:extLst>
+              </p:cNvPr>
+              <p:cNvSpPr>
+                <a:spLocks noGrp="1" noRot="1" noChangeAspect="1" noMove="1" noResize="1" noEditPoints="1" noAdjustHandles="1" noChangeArrowheads="1" noChangeShapeType="1" noTextEdit="1"/>
+              </p:cNvSpPr>
+              <p:nvPr>
+                <p:ph idx="1"/>
+              </p:nvPr>
+            </p:nvSpPr>
+            <p:spPr>
+              <a:xfrm>
+                <a:off x="838200" y="1048872"/>
+                <a:ext cx="10515600" cy="5128091"/>
+              </a:xfrm>
+              <a:blipFill>
+                <a:blip r:embed="rId2"/>
+                <a:stretch>
+                  <a:fillRect l="-928" t="-1665" r="-290"/>
+                </a:stretch>
+              </a:blipFill>
+            </p:spPr>
+            <p:txBody>
+              <a:bodyPr/>
+              <a:lstStyle/>
+              <a:p>
+                <a:r>
+                  <a:rPr lang="en-US">
+                    <a:noFill/>
+                  </a:rPr>
+                  <a:t> </a:t>
+                </a:r>
+              </a:p>
+            </p:txBody>
+          </p:sp>
+        </mc:Fallback>
+      </mc:AlternateContent>
+    </p:spTree>
+    <p:extLst>
+      <p:ext uri="{BB962C8B-B14F-4D97-AF65-F5344CB8AC3E}">
+        <p14:creationId xmlns:p14="http://schemas.microsoft.com/office/powerpoint/2010/main" val="3501166676"/>
+      </p:ext>
+    </p:extLst>
+  </p:cSld>
+  <p:clrMapOvr>
+    <a:masterClrMapping/>
+  </p:clrMapOvr>
+</p:sld>
+</file>
+
+<file path=ppt/slides/slide15.xml><?xml version="1.0" encoding="utf-8"?>
+<p:sld xmlns:a="http://schemas.openxmlformats.org/drawingml/2006/main" xmlns:r="http://schemas.openxmlformats.org/officeDocument/2006/relationships" xmlns:p="http://schemas.openxmlformats.org/presentationml/2006/main">
+  <p:cSld>
+    <p:spTree>
+      <p:nvGrpSpPr>
+        <p:cNvPr id="1" name=""/>
+        <p:cNvGrpSpPr/>
+        <p:nvPr/>
+      </p:nvGrpSpPr>
+      <p:grpSpPr>
+        <a:xfrm>
+          <a:off x="0" y="0"/>
+          <a:ext cx="0" cy="0"/>
+          <a:chOff x="0" y="0"/>
+          <a:chExt cx="0" cy="0"/>
+        </a:xfrm>
+      </p:grpSpPr>
+      <p:sp>
+        <p:nvSpPr>
+          <p:cNvPr id="2" name="Title 1">
+            <a:extLst>
+              <a:ext uri="{FF2B5EF4-FFF2-40B4-BE49-F238E27FC236}">
                 <a16:creationId xmlns:a16="http://schemas.microsoft.com/office/drawing/2014/main" id="{CC67C270-6B40-49A8-A4C9-06B7036AD7E7}"/>
               </a:ext>
             </a:extLst>
@@ -5187,7 +6490,7 @@
                 <a:latin typeface="Times New Roman" panose="02020603050405020304" pitchFamily="18" charset="0"/>
                 <a:cs typeface="Times New Roman" panose="02020603050405020304" pitchFamily="18" charset="0"/>
               </a:rPr>
-              <a:t>Problem 3</a:t>
+              <a:t>Problem 4</a:t>
             </a:r>
           </a:p>
         </p:txBody>
@@ -5571,7 +6874,7 @@
 </p:sld>
 </file>
 
-<file path=ppt/slides/slide13.xml><?xml version="1.0" encoding="utf-8"?>
+<file path=ppt/slides/slide16.xml><?xml version="1.0" encoding="utf-8"?>
 <p:sld xmlns:a="http://schemas.openxmlformats.org/drawingml/2006/main" xmlns:r="http://schemas.openxmlformats.org/officeDocument/2006/relationships" xmlns:p="http://schemas.openxmlformats.org/presentationml/2006/main">
   <p:cSld>
     <p:spTree>
@@ -5614,13 +6917,13 @@
                 <a:latin typeface="Times New Roman" panose="02020603050405020304" pitchFamily="18" charset="0"/>
                 <a:cs typeface="Times New Roman" panose="02020603050405020304" pitchFamily="18" charset="0"/>
               </a:rPr>
-              <a:t>Problem 3</a:t>
+              <a:t>Problem 4</a:t>
             </a:r>
           </a:p>
         </p:txBody>
       </p:sp>
-      <mc:AlternateContent xmlns:mc="http://schemas.openxmlformats.org/markup-compatibility/2006">
-        <mc:Choice xmlns:a14="http://schemas.microsoft.com/office/drawing/2010/main" Requires="a14">
+      <mc:AlternateContent xmlns:mc="http://schemas.openxmlformats.org/markup-compatibility/2006" xmlns:a14="http://schemas.microsoft.com/office/drawing/2010/main">
+        <mc:Choice Requires="a14">
           <p:sp>
             <p:nvSpPr>
               <p:cNvPr id="3" name="Content Placeholder 2">
@@ -5794,14 +7097,7 @@
                           <a:latin typeface="Cambria Math" panose="02040503050406030204" pitchFamily="18" charset="0"/>
                           <a:cs typeface="Times New Roman" panose="02020603050405020304" pitchFamily="18" charset="0"/>
                         </a:rPr>
-                        <m:t>= </m:t>
-                      </m:r>
-                      <m:r>
-                        <a:rPr lang="en-US" b="0" i="1" smtClean="0">
-                          <a:latin typeface="Cambria Math" panose="02040503050406030204" pitchFamily="18" charset="0"/>
-                          <a:cs typeface="Times New Roman" panose="02020603050405020304" pitchFamily="18" charset="0"/>
-                        </a:rPr>
-                        <m:t>100</m:t>
+                        <m:t>= 100</m:t>
                       </m:r>
                       <m:r>
                         <a:rPr lang="en-US" b="0" i="1" smtClean="0">
@@ -5850,28 +7146,7 @@
                           <a:latin typeface="Cambria Math" panose="02040503050406030204" pitchFamily="18" charset="0"/>
                           <a:cs typeface="Times New Roman" panose="02020603050405020304" pitchFamily="18" charset="0"/>
                         </a:rPr>
-                        <m:t>+</m:t>
-                      </m:r>
-                      <m:r>
-                        <a:rPr lang="en-US" b="0" i="1" smtClean="0">
-                          <a:latin typeface="Cambria Math" panose="02040503050406030204" pitchFamily="18" charset="0"/>
-                          <a:cs typeface="Times New Roman" panose="02020603050405020304" pitchFamily="18" charset="0"/>
-                        </a:rPr>
-                        <m:t>40</m:t>
-                      </m:r>
-                      <m:r>
-                        <a:rPr lang="en-US" b="0" i="1" smtClean="0">
-                          <a:latin typeface="Cambria Math" panose="02040503050406030204" pitchFamily="18" charset="0"/>
-                          <a:cs typeface="Times New Roman" panose="02020603050405020304" pitchFamily="18" charset="0"/>
-                        </a:rPr>
-                        <m:t>,</m:t>
-                      </m:r>
-                      <m:r>
-                        <a:rPr lang="en-US" b="0" i="1" smtClean="0">
-                          <a:latin typeface="Cambria Math" panose="02040503050406030204" pitchFamily="18" charset="0"/>
-                          <a:cs typeface="Times New Roman" panose="02020603050405020304" pitchFamily="18" charset="0"/>
-                        </a:rPr>
-                        <m:t>000</m:t>
+                        <m:t>+40,000</m:t>
                       </m:r>
                       <m:sSub>
                         <m:sSubPr>
@@ -5906,28 +7181,7 @@
                           <a:latin typeface="Cambria Math" panose="02040503050406030204" pitchFamily="18" charset="0"/>
                           <a:cs typeface="Times New Roman" panose="02020603050405020304" pitchFamily="18" charset="0"/>
                         </a:rPr>
-                        <m:t>+</m:t>
-                      </m:r>
-                      <m:r>
-                        <a:rPr lang="en-US" b="0" i="1" smtClean="0">
-                          <a:latin typeface="Cambria Math" panose="02040503050406030204" pitchFamily="18" charset="0"/>
-                          <a:cs typeface="Times New Roman" panose="02020603050405020304" pitchFamily="18" charset="0"/>
-                        </a:rPr>
-                        <m:t>18</m:t>
-                      </m:r>
-                      <m:r>
-                        <a:rPr lang="en-US" b="0" i="1" smtClean="0">
-                          <a:latin typeface="Cambria Math" panose="02040503050406030204" pitchFamily="18" charset="0"/>
-                          <a:cs typeface="Times New Roman" panose="02020603050405020304" pitchFamily="18" charset="0"/>
-                        </a:rPr>
-                        <m:t>,</m:t>
-                      </m:r>
-                      <m:r>
-                        <a:rPr lang="en-US" b="0" i="1" smtClean="0">
-                          <a:latin typeface="Cambria Math" panose="02040503050406030204" pitchFamily="18" charset="0"/>
-                          <a:cs typeface="Times New Roman" panose="02020603050405020304" pitchFamily="18" charset="0"/>
-                        </a:rPr>
-                        <m:t>000</m:t>
+                        <m:t>+18,000</m:t>
                       </m:r>
                       <m:sSub>
                         <m:sSubPr>
@@ -6344,7 +7598,7 @@
             </p:txBody>
           </p:sp>
         </mc:Choice>
-        <mc:Fallback>
+        <mc:Fallback xmlns="">
           <p:sp>
             <p:nvSpPr>
               <p:cNvPr id="3" name="Content Placeholder 2">
@@ -6397,7 +7651,7 @@
 </p:sld>
 </file>
 
-<file path=ppt/slides/slide14.xml><?xml version="1.0" encoding="utf-8"?>
+<file path=ppt/slides/slide17.xml><?xml version="1.0" encoding="utf-8"?>
 <p:sld xmlns:a="http://schemas.openxmlformats.org/drawingml/2006/main" xmlns:r="http://schemas.openxmlformats.org/officeDocument/2006/relationships" xmlns:p="http://schemas.openxmlformats.org/presentationml/2006/main">
   <p:cSld>
     <p:spTree>
@@ -6440,13 +7694,13 @@
                 <a:latin typeface="Times New Roman" panose="02020603050405020304" pitchFamily="18" charset="0"/>
                 <a:cs typeface="Times New Roman" panose="02020603050405020304" pitchFamily="18" charset="0"/>
               </a:rPr>
-              <a:t>Problem 3</a:t>
+              <a:t>Problem 4</a:t>
             </a:r>
           </a:p>
         </p:txBody>
       </p:sp>
-      <mc:AlternateContent xmlns:mc="http://schemas.openxmlformats.org/markup-compatibility/2006">
-        <mc:Choice xmlns:a14="http://schemas.microsoft.com/office/drawing/2010/main" Requires="a14">
+      <mc:AlternateContent xmlns:mc="http://schemas.openxmlformats.org/markup-compatibility/2006" xmlns:a14="http://schemas.microsoft.com/office/drawing/2010/main">
+        <mc:Choice Requires="a14">
           <p:sp>
             <p:nvSpPr>
               <p:cNvPr id="3" name="Content Placeholder 2">
@@ -6788,7 +8042,7 @@
             </p:txBody>
           </p:sp>
         </mc:Choice>
-        <mc:Fallback>
+        <mc:Fallback xmlns="">
           <p:sp>
             <p:nvSpPr>
               <p:cNvPr id="3" name="Content Placeholder 2">
@@ -6841,7 +8095,7 @@
 </p:sld>
 </file>
 
-<file path=ppt/slides/slide15.xml><?xml version="1.0" encoding="utf-8"?>
+<file path=ppt/slides/slide18.xml><?xml version="1.0" encoding="utf-8"?>
 <p:sld xmlns:a="http://schemas.openxmlformats.org/drawingml/2006/main" xmlns:r="http://schemas.openxmlformats.org/officeDocument/2006/relationships" xmlns:p="http://schemas.openxmlformats.org/presentationml/2006/main">
   <p:cSld>
     <p:spTree>
@@ -6884,13 +8138,13 @@
                 <a:latin typeface="Times New Roman" panose="02020603050405020304" pitchFamily="18" charset="0"/>
                 <a:cs typeface="Times New Roman" panose="02020603050405020304" pitchFamily="18" charset="0"/>
               </a:rPr>
-              <a:t>Problem 3</a:t>
+              <a:t>Problem 4</a:t>
             </a:r>
           </a:p>
         </p:txBody>
       </p:sp>
-      <mc:AlternateContent xmlns:mc="http://schemas.openxmlformats.org/markup-compatibility/2006">
-        <mc:Choice xmlns:a14="http://schemas.microsoft.com/office/drawing/2010/main" Requires="a14">
+      <mc:AlternateContent xmlns:mc="http://schemas.openxmlformats.org/markup-compatibility/2006" xmlns:a14="http://schemas.microsoft.com/office/drawing/2010/main">
+        <mc:Choice Requires="a14">
           <p:sp>
             <p:nvSpPr>
               <p:cNvPr id="3" name="Content Placeholder 2">
@@ -6966,7 +8220,28 @@
                           <a:latin typeface="Cambria Math" panose="02040503050406030204" pitchFamily="18" charset="0"/>
                           <a:cs typeface="Times New Roman" panose="02020603050405020304" pitchFamily="18" charset="0"/>
                         </a:rPr>
-                        <m:t>≥0.1</m:t>
+                        <m:t>≥</m:t>
+                      </m:r>
+                      <m:r>
+                        <a:rPr lang="en-US" b="0" i="1" smtClean="0">
+                          <a:latin typeface="Cambria Math" panose="02040503050406030204" pitchFamily="18" charset="0"/>
+                          <a:cs typeface="Times New Roman" panose="02020603050405020304" pitchFamily="18" charset="0"/>
+                        </a:rPr>
+                        <m:t>0</m:t>
+                      </m:r>
+                      <m:r>
+                        <a:rPr lang="en-US" b="0" i="1" smtClean="0">
+                          <a:latin typeface="Cambria Math" panose="02040503050406030204" pitchFamily="18" charset="0"/>
+                          <a:cs typeface="Times New Roman" panose="02020603050405020304" pitchFamily="18" charset="0"/>
+                        </a:rPr>
+                        <m:t>.</m:t>
+                      </m:r>
+                      <m:r>
+                        <a:rPr lang="en-US" b="0" i="1" smtClean="0">
+                          <a:latin typeface="Cambria Math" panose="02040503050406030204" pitchFamily="18" charset="0"/>
+                          <a:cs typeface="Times New Roman" panose="02020603050405020304" pitchFamily="18" charset="0"/>
+                        </a:rPr>
+                        <m:t>1</m:t>
                       </m:r>
                       <m:d>
                         <m:dPr>
@@ -7148,7 +8423,14 @@
                           <a:latin typeface="Cambria Math" panose="02040503050406030204" pitchFamily="18" charset="0"/>
                           <a:cs typeface="Times New Roman" panose="02020603050405020304" pitchFamily="18" charset="0"/>
                         </a:rPr>
-                        <m:t>+600</m:t>
+                        <m:t>+</m:t>
+                      </m:r>
+                      <m:r>
+                        <a:rPr lang="en-US" b="0" i="1" smtClean="0">
+                          <a:latin typeface="Cambria Math" panose="02040503050406030204" pitchFamily="18" charset="0"/>
+                          <a:cs typeface="Times New Roman" panose="02020603050405020304" pitchFamily="18" charset="0"/>
+                        </a:rPr>
+                        <m:t>600</m:t>
                       </m:r>
                       <m:sSub>
                         <m:sSubPr>
@@ -7183,7 +8465,14 @@
                           <a:latin typeface="Cambria Math" panose="02040503050406030204" pitchFamily="18" charset="0"/>
                           <a:cs typeface="Times New Roman" panose="02020603050405020304" pitchFamily="18" charset="0"/>
                         </a:rPr>
-                        <m:t>+300</m:t>
+                        <m:t>+</m:t>
+                      </m:r>
+                      <m:r>
+                        <a:rPr lang="en-US" b="0" i="1" smtClean="0">
+                          <a:latin typeface="Cambria Math" panose="02040503050406030204" pitchFamily="18" charset="0"/>
+                          <a:cs typeface="Times New Roman" panose="02020603050405020304" pitchFamily="18" charset="0"/>
+                        </a:rPr>
+                        <m:t>300</m:t>
                       </m:r>
                       <m:sSub>
                         <m:sSubPr>
@@ -7218,7 +8507,14 @@
                           <a:latin typeface="Cambria Math" panose="02040503050406030204" pitchFamily="18" charset="0"/>
                           <a:cs typeface="Times New Roman" panose="02020603050405020304" pitchFamily="18" charset="0"/>
                         </a:rPr>
-                        <m:t>≤18200</m:t>
+                        <m:t>≤</m:t>
+                      </m:r>
+                      <m:r>
+                        <a:rPr lang="en-US" b="0" i="1" smtClean="0">
+                          <a:latin typeface="Cambria Math" panose="02040503050406030204" pitchFamily="18" charset="0"/>
+                          <a:cs typeface="Times New Roman" panose="02020603050405020304" pitchFamily="18" charset="0"/>
+                        </a:rPr>
+                        <m:t>18200</m:t>
                       </m:r>
                     </m:oMath>
                   </m:oMathPara>
@@ -7283,7 +8579,14 @@
                           <a:latin typeface="Cambria Math" panose="02040503050406030204" pitchFamily="18" charset="0"/>
                           <a:cs typeface="Times New Roman" panose="02020603050405020304" pitchFamily="18" charset="0"/>
                         </a:rPr>
-                        <m:t>≥0</m:t>
+                        <m:t>≥</m:t>
+                      </m:r>
+                      <m:r>
+                        <a:rPr lang="en-US" b="0" i="1" smtClean="0">
+                          <a:latin typeface="Cambria Math" panose="02040503050406030204" pitchFamily="18" charset="0"/>
+                          <a:cs typeface="Times New Roman" panose="02020603050405020304" pitchFamily="18" charset="0"/>
+                        </a:rPr>
+                        <m:t>0</m:t>
                       </m:r>
                     </m:oMath>
                   </m:oMathPara>
@@ -7336,7 +8639,14 @@
                           <a:latin typeface="Cambria Math" panose="02040503050406030204" pitchFamily="18" charset="0"/>
                           <a:cs typeface="Times New Roman" panose="02020603050405020304" pitchFamily="18" charset="0"/>
                         </a:rPr>
-                        <m:t>≥0</m:t>
+                        <m:t>≥</m:t>
+                      </m:r>
+                      <m:r>
+                        <a:rPr lang="en-US" b="0" i="1" smtClean="0">
+                          <a:latin typeface="Cambria Math" panose="02040503050406030204" pitchFamily="18" charset="0"/>
+                          <a:cs typeface="Times New Roman" panose="02020603050405020304" pitchFamily="18" charset="0"/>
+                        </a:rPr>
+                        <m:t>0</m:t>
                       </m:r>
                     </m:oMath>
                   </m:oMathPara>
@@ -7389,7 +8699,14 @@
                           <a:latin typeface="Cambria Math" panose="02040503050406030204" pitchFamily="18" charset="0"/>
                           <a:cs typeface="Times New Roman" panose="02020603050405020304" pitchFamily="18" charset="0"/>
                         </a:rPr>
-                        <m:t>≥0</m:t>
+                        <m:t>≥</m:t>
+                      </m:r>
+                      <m:r>
+                        <a:rPr lang="en-US" b="0" i="1" smtClean="0">
+                          <a:latin typeface="Cambria Math" panose="02040503050406030204" pitchFamily="18" charset="0"/>
+                          <a:cs typeface="Times New Roman" panose="02020603050405020304" pitchFamily="18" charset="0"/>
+                        </a:rPr>
+                        <m:t>0</m:t>
                       </m:r>
                     </m:oMath>
                   </m:oMathPara>
@@ -7402,7 +8719,7 @@
             </p:txBody>
           </p:sp>
         </mc:Choice>
-        <mc:Fallback>
+        <mc:Fallback xmlns="">
           <p:sp>
             <p:nvSpPr>
               <p:cNvPr id="3" name="Content Placeholder 2">
@@ -7455,7 +8772,7 @@
 </p:sld>
 </file>
 
-<file path=ppt/slides/slide16.xml><?xml version="1.0" encoding="utf-8"?>
+<file path=ppt/slides/slide19.xml><?xml version="1.0" encoding="utf-8"?>
 <p:sld xmlns:a="http://schemas.openxmlformats.org/drawingml/2006/main" xmlns:r="http://schemas.openxmlformats.org/officeDocument/2006/relationships" xmlns:p="http://schemas.openxmlformats.org/presentationml/2006/main">
   <p:cSld>
     <p:spTree>
@@ -7498,13 +8815,13 @@
                 <a:latin typeface="Times New Roman" panose="02020603050405020304" pitchFamily="18" charset="0"/>
                 <a:cs typeface="Times New Roman" panose="02020603050405020304" pitchFamily="18" charset="0"/>
               </a:rPr>
-              <a:t>Problem 3</a:t>
+              <a:t>Problem 4</a:t>
             </a:r>
           </a:p>
         </p:txBody>
       </p:sp>
-      <mc:AlternateContent xmlns:mc="http://schemas.openxmlformats.org/markup-compatibility/2006">
-        <mc:Choice xmlns:a14="http://schemas.microsoft.com/office/drawing/2010/main" Requires="a14">
+      <mc:AlternateContent xmlns:mc="http://schemas.openxmlformats.org/markup-compatibility/2006" xmlns:a14="http://schemas.microsoft.com/office/drawing/2010/main">
+        <mc:Choice Requires="a14">
           <p:sp>
             <p:nvSpPr>
               <p:cNvPr id="3" name="Content Placeholder 2">
@@ -8534,7 +9851,7 @@
             </p:txBody>
           </p:sp>
         </mc:Choice>
-        <mc:Fallback>
+        <mc:Fallback xmlns="">
           <p:sp>
             <p:nvSpPr>
               <p:cNvPr id="3" name="Content Placeholder 2">
@@ -8587,7 +9904,176 @@
 </p:sld>
 </file>
 
-<file path=ppt/slides/slide17.xml><?xml version="1.0" encoding="utf-8"?>
+<file path=ppt/slides/slide2.xml><?xml version="1.0" encoding="utf-8"?>
+<p:sld xmlns:a="http://schemas.openxmlformats.org/drawingml/2006/main" xmlns:r="http://schemas.openxmlformats.org/officeDocument/2006/relationships" xmlns:p="http://schemas.openxmlformats.org/presentationml/2006/main">
+  <p:cSld>
+    <p:spTree>
+      <p:nvGrpSpPr>
+        <p:cNvPr id="1" name=""/>
+        <p:cNvGrpSpPr/>
+        <p:nvPr/>
+      </p:nvGrpSpPr>
+      <p:grpSpPr>
+        <a:xfrm>
+          <a:off x="0" y="0"/>
+          <a:ext cx="0" cy="0"/>
+          <a:chOff x="0" y="0"/>
+          <a:chExt cx="0" cy="0"/>
+        </a:xfrm>
+      </p:grpSpPr>
+      <p:sp>
+        <p:nvSpPr>
+          <p:cNvPr id="2" name="Title 1">
+            <a:extLst>
+              <a:ext uri="{FF2B5EF4-FFF2-40B4-BE49-F238E27FC236}">
+                <a16:creationId xmlns:a16="http://schemas.microsoft.com/office/drawing/2014/main" id="{907C41F1-9BA1-4A58-B862-A9BF39036532}"/>
+              </a:ext>
+            </a:extLst>
+          </p:cNvPr>
+          <p:cNvSpPr>
+            <a:spLocks noGrp="1"/>
+          </p:cNvSpPr>
+          <p:nvPr>
+            <p:ph type="title"/>
+          </p:nvPr>
+        </p:nvSpPr>
+        <p:spPr>
+          <a:xfrm>
+            <a:off x="838200" y="365125"/>
+            <a:ext cx="10515600" cy="594099"/>
+          </a:xfrm>
+        </p:spPr>
+        <p:txBody>
+          <a:bodyPr>
+            <a:normAutofit fontScale="90000"/>
+          </a:bodyPr>
+          <a:lstStyle/>
+          <a:p>
+            <a:r>
+              <a:rPr lang="en-US" dirty="0">
+                <a:latin typeface="Times New Roman" panose="02020603050405020304" pitchFamily="18" charset="0"/>
+                <a:cs typeface="Times New Roman" panose="02020603050405020304" pitchFamily="18" charset="0"/>
+              </a:rPr>
+              <a:t>Introduction</a:t>
+            </a:r>
+          </a:p>
+        </p:txBody>
+      </p:sp>
+      <p:sp>
+        <p:nvSpPr>
+          <p:cNvPr id="3" name="Content Placeholder 2">
+            <a:extLst>
+              <a:ext uri="{FF2B5EF4-FFF2-40B4-BE49-F238E27FC236}">
+                <a16:creationId xmlns:a16="http://schemas.microsoft.com/office/drawing/2014/main" id="{09FA02AA-5E7F-412B-9A2D-840CC00BBBE4}"/>
+              </a:ext>
+            </a:extLst>
+          </p:cNvPr>
+          <p:cNvSpPr>
+            <a:spLocks noGrp="1"/>
+          </p:cNvSpPr>
+          <p:nvPr>
+            <p:ph idx="1"/>
+          </p:nvPr>
+        </p:nvSpPr>
+        <p:spPr>
+          <a:xfrm>
+            <a:off x="838200" y="1102659"/>
+            <a:ext cx="10515600" cy="5074304"/>
+          </a:xfrm>
+        </p:spPr>
+        <p:txBody>
+          <a:bodyPr>
+            <a:normAutofit/>
+          </a:bodyPr>
+          <a:lstStyle/>
+          <a:p>
+            <a:pPr marL="0" indent="0">
+              <a:buNone/>
+            </a:pPr>
+            <a:r>
+              <a:rPr lang="en-US" sz="2400" dirty="0">
+                <a:latin typeface="Times New Roman" panose="02020603050405020304" pitchFamily="18" charset="0"/>
+                <a:cs typeface="Times New Roman" panose="02020603050405020304" pitchFamily="18" charset="0"/>
+              </a:rPr>
+              <a:t>In the real world, we often encounter problems that require minimizing or maximizing a certain value according to some constraints. </a:t>
+            </a:r>
+          </a:p>
+          <a:p>
+            <a:pPr marL="0" indent="0">
+              <a:buNone/>
+            </a:pPr>
+            <a:r>
+              <a:rPr lang="en-US" sz="2400" dirty="0">
+                <a:latin typeface="Times New Roman" panose="02020603050405020304" pitchFamily="18" charset="0"/>
+                <a:cs typeface="Times New Roman" panose="02020603050405020304" pitchFamily="18" charset="0"/>
+              </a:rPr>
+              <a:t>These problems are given as statements that include some information about what it is required to achieve and what constraints are imposed. </a:t>
+            </a:r>
+          </a:p>
+          <a:p>
+            <a:pPr marL="0" indent="0">
+              <a:buNone/>
+            </a:pPr>
+            <a:r>
+              <a:rPr lang="en-US" sz="2400" dirty="0">
+                <a:latin typeface="Times New Roman" panose="02020603050405020304" pitchFamily="18" charset="0"/>
+                <a:cs typeface="Times New Roman" panose="02020603050405020304" pitchFamily="18" charset="0"/>
+              </a:rPr>
+              <a:t>To turn these English expressions into Mathematical expressions, we can follow these general steps:  </a:t>
+            </a:r>
+          </a:p>
+          <a:p>
+            <a:pPr marL="457200" indent="-457200">
+              <a:buAutoNum type="arabicPeriod"/>
+            </a:pPr>
+            <a:r>
+              <a:rPr lang="en-US" sz="2400" dirty="0">
+                <a:latin typeface="Times New Roman" panose="02020603050405020304" pitchFamily="18" charset="0"/>
+                <a:cs typeface="Times New Roman" panose="02020603050405020304" pitchFamily="18" charset="0"/>
+              </a:rPr>
+              <a:t>Identify the goal of the problem, which is called “the objective function”. What do we want to maximize or minimize?</a:t>
+            </a:r>
+          </a:p>
+          <a:p>
+            <a:pPr marL="457200" indent="-457200">
+              <a:buAutoNum type="arabicPeriod"/>
+            </a:pPr>
+            <a:r>
+              <a:rPr lang="en-US" sz="2400" dirty="0">
+                <a:latin typeface="Times New Roman" panose="02020603050405020304" pitchFamily="18" charset="0"/>
+                <a:cs typeface="Times New Roman" panose="02020603050405020304" pitchFamily="18" charset="0"/>
+              </a:rPr>
+              <a:t>Search for the constraints imposed on the objective function. What should be done while minimizing or maximizing the objective function?</a:t>
+            </a:r>
+          </a:p>
+          <a:p>
+            <a:pPr marL="457200" indent="-457200">
+              <a:buAutoNum type="arabicPeriod"/>
+            </a:pPr>
+            <a:r>
+              <a:rPr lang="en-US" sz="2400" dirty="0">
+                <a:latin typeface="Times New Roman" panose="02020603050405020304" pitchFamily="18" charset="0"/>
+                <a:cs typeface="Times New Roman" panose="02020603050405020304" pitchFamily="18" charset="0"/>
+              </a:rPr>
+              <a:t>Search for statements that tell you about the boundaries of each variable of the objective function. Are the variables required to be only positive, only negative, or should fall within a specific range?</a:t>
+            </a:r>
+          </a:p>
+        </p:txBody>
+      </p:sp>
+    </p:spTree>
+    <p:extLst>
+      <p:ext uri="{BB962C8B-B14F-4D97-AF65-F5344CB8AC3E}">
+        <p14:creationId xmlns:p14="http://schemas.microsoft.com/office/powerpoint/2010/main" val="3267437923"/>
+      </p:ext>
+    </p:extLst>
+  </p:cSld>
+  <p:clrMapOvr>
+    <a:masterClrMapping/>
+  </p:clrMapOvr>
+</p:sld>
+</file>
+
+<file path=ppt/slides/slide20.xml><?xml version="1.0" encoding="utf-8"?>
 <p:sld xmlns:a="http://schemas.openxmlformats.org/drawingml/2006/main" xmlns:r="http://schemas.openxmlformats.org/officeDocument/2006/relationships" xmlns:p="http://schemas.openxmlformats.org/presentationml/2006/main">
   <p:cSld>
     <p:spTree>
@@ -8635,13 +10121,13 @@
                 <a:latin typeface="Times New Roman" panose="02020603050405020304" pitchFamily="18" charset="0"/>
                 <a:cs typeface="Times New Roman" panose="02020603050405020304" pitchFamily="18" charset="0"/>
               </a:rPr>
-              <a:t>Problem 3</a:t>
+              <a:t>Problem 4</a:t>
             </a:r>
           </a:p>
         </p:txBody>
       </p:sp>
-      <mc:AlternateContent xmlns:mc="http://schemas.openxmlformats.org/markup-compatibility/2006">
-        <mc:Choice xmlns:a14="http://schemas.microsoft.com/office/drawing/2010/main" Requires="a14">
+      <mc:AlternateContent xmlns:mc="http://schemas.openxmlformats.org/markup-compatibility/2006" xmlns:a14="http://schemas.microsoft.com/office/drawing/2010/main">
+        <mc:Choice Requires="a14">
           <p:sp>
             <p:nvSpPr>
               <p:cNvPr id="3" name="Content Placeholder 2">
@@ -8825,7 +10311,28 @@
                           <a:latin typeface="Cambria Math" panose="02040503050406030204" pitchFamily="18" charset="0"/>
                           <a:cs typeface="Times New Roman" panose="02020603050405020304" pitchFamily="18" charset="0"/>
                         </a:rPr>
-                        <m:t>=100,000</m:t>
+                        <m:t>=</m:t>
+                      </m:r>
+                      <m:r>
+                        <a:rPr lang="en-US" sz="2400" i="1">
+                          <a:latin typeface="Cambria Math" panose="02040503050406030204" pitchFamily="18" charset="0"/>
+                          <a:cs typeface="Times New Roman" panose="02020603050405020304" pitchFamily="18" charset="0"/>
+                        </a:rPr>
+                        <m:t>100</m:t>
+                      </m:r>
+                      <m:r>
+                        <a:rPr lang="en-US" sz="2400" i="1">
+                          <a:latin typeface="Cambria Math" panose="02040503050406030204" pitchFamily="18" charset="0"/>
+                          <a:cs typeface="Times New Roman" panose="02020603050405020304" pitchFamily="18" charset="0"/>
+                        </a:rPr>
+                        <m:t>,</m:t>
+                      </m:r>
+                      <m:r>
+                        <a:rPr lang="en-US" sz="2400" i="1">
+                          <a:latin typeface="Cambria Math" panose="02040503050406030204" pitchFamily="18" charset="0"/>
+                          <a:cs typeface="Times New Roman" panose="02020603050405020304" pitchFamily="18" charset="0"/>
+                        </a:rPr>
+                        <m:t>000</m:t>
                       </m:r>
                       <m:sSub>
                         <m:sSubPr>
@@ -8860,7 +10367,28 @@
                           <a:latin typeface="Cambria Math" panose="02040503050406030204" pitchFamily="18" charset="0"/>
                           <a:cs typeface="Times New Roman" panose="02020603050405020304" pitchFamily="18" charset="0"/>
                         </a:rPr>
-                        <m:t>+40,000</m:t>
+                        <m:t>+</m:t>
+                      </m:r>
+                      <m:r>
+                        <a:rPr lang="en-US" sz="2400" i="1">
+                          <a:latin typeface="Cambria Math" panose="02040503050406030204" pitchFamily="18" charset="0"/>
+                          <a:cs typeface="Times New Roman" panose="02020603050405020304" pitchFamily="18" charset="0"/>
+                        </a:rPr>
+                        <m:t>40</m:t>
+                      </m:r>
+                      <m:r>
+                        <a:rPr lang="en-US" sz="2400" i="1">
+                          <a:latin typeface="Cambria Math" panose="02040503050406030204" pitchFamily="18" charset="0"/>
+                          <a:cs typeface="Times New Roman" panose="02020603050405020304" pitchFamily="18" charset="0"/>
+                        </a:rPr>
+                        <m:t>,</m:t>
+                      </m:r>
+                      <m:r>
+                        <a:rPr lang="en-US" sz="2400" i="1">
+                          <a:latin typeface="Cambria Math" panose="02040503050406030204" pitchFamily="18" charset="0"/>
+                          <a:cs typeface="Times New Roman" panose="02020603050405020304" pitchFamily="18" charset="0"/>
+                        </a:rPr>
+                        <m:t>000</m:t>
                       </m:r>
                       <m:sSub>
                         <m:sSubPr>
@@ -8895,7 +10423,14 @@
                           <a:latin typeface="Cambria Math" panose="02040503050406030204" pitchFamily="18" charset="0"/>
                           <a:cs typeface="Times New Roman" panose="02020603050405020304" pitchFamily="18" charset="0"/>
                         </a:rPr>
-                        <m:t>+18000</m:t>
+                        <m:t>+</m:t>
+                      </m:r>
+                      <m:r>
+                        <a:rPr lang="en-US" sz="2400" i="1">
+                          <a:latin typeface="Cambria Math" panose="02040503050406030204" pitchFamily="18" charset="0"/>
+                          <a:cs typeface="Times New Roman" panose="02020603050405020304" pitchFamily="18" charset="0"/>
+                        </a:rPr>
+                        <m:t>18000</m:t>
                       </m:r>
                       <m:sSub>
                         <m:sSubPr>
@@ -8988,7 +10523,14 @@
                           <a:latin typeface="Cambria Math" panose="02040503050406030204" pitchFamily="18" charset="0"/>
                           <a:cs typeface="Times New Roman" panose="02020603050405020304" pitchFamily="18" charset="0"/>
                         </a:rPr>
-                        <m:t>≤10</m:t>
+                        <m:t>≤</m:t>
+                      </m:r>
+                      <m:r>
+                        <a:rPr lang="en-US" sz="2400" b="0" i="1" smtClean="0">
+                          <a:latin typeface="Cambria Math" panose="02040503050406030204" pitchFamily="18" charset="0"/>
+                          <a:cs typeface="Times New Roman" panose="02020603050405020304" pitchFamily="18" charset="0"/>
+                        </a:rPr>
+                        <m:t>10</m:t>
                       </m:r>
                     </m:oMath>
                   </m:oMathPara>
@@ -9118,7 +10660,14 @@
                           <a:latin typeface="Cambria Math" panose="02040503050406030204" pitchFamily="18" charset="0"/>
                           <a:cs typeface="Times New Roman" panose="02020603050405020304" pitchFamily="18" charset="0"/>
                         </a:rPr>
-                        <m:t>≤0</m:t>
+                        <m:t>≤</m:t>
+                      </m:r>
+                      <m:r>
+                        <a:rPr lang="en-US" sz="2400" b="0" i="1" smtClean="0">
+                          <a:latin typeface="Cambria Math" panose="02040503050406030204" pitchFamily="18" charset="0"/>
+                          <a:cs typeface="Times New Roman" panose="02020603050405020304" pitchFamily="18" charset="0"/>
+                        </a:rPr>
+                        <m:t>0</m:t>
                       </m:r>
                     </m:oMath>
                   </m:oMathPara>
@@ -9143,7 +10692,14 @@
                           <a:latin typeface="Cambria Math" panose="02040503050406030204" pitchFamily="18" charset="0"/>
                           <a:cs typeface="Times New Roman" panose="02020603050405020304" pitchFamily="18" charset="0"/>
                         </a:rPr>
-                        <m:t>−9</m:t>
+                        <m:t>−</m:t>
+                      </m:r>
+                      <m:r>
+                        <a:rPr lang="en-US" sz="2400" b="0" i="1" smtClean="0">
+                          <a:latin typeface="Cambria Math" panose="02040503050406030204" pitchFamily="18" charset="0"/>
+                          <a:cs typeface="Times New Roman" panose="02020603050405020304" pitchFamily="18" charset="0"/>
+                        </a:rPr>
+                        <m:t>9</m:t>
                       </m:r>
                       <m:sSub>
                         <m:sSubPr>
@@ -9248,7 +10804,14 @@
                           <a:latin typeface="Cambria Math" panose="02040503050406030204" pitchFamily="18" charset="0"/>
                           <a:cs typeface="Times New Roman" panose="02020603050405020304" pitchFamily="18" charset="0"/>
                         </a:rPr>
-                        <m:t>≤0</m:t>
+                        <m:t>≤</m:t>
+                      </m:r>
+                      <m:r>
+                        <a:rPr lang="en-US" sz="2400" b="0" i="1" smtClean="0">
+                          <a:latin typeface="Cambria Math" panose="02040503050406030204" pitchFamily="18" charset="0"/>
+                          <a:cs typeface="Times New Roman" panose="02020603050405020304" pitchFamily="18" charset="0"/>
+                        </a:rPr>
+                        <m:t>0</m:t>
                       </m:r>
                     </m:oMath>
                   </m:oMathPara>
@@ -9308,7 +10871,14 @@
                           <a:latin typeface="Cambria Math" panose="02040503050406030204" pitchFamily="18" charset="0"/>
                           <a:cs typeface="Times New Roman" panose="02020603050405020304" pitchFamily="18" charset="0"/>
                         </a:rPr>
-                        <m:t>+6</m:t>
+                        <m:t>+</m:t>
+                      </m:r>
+                      <m:r>
+                        <a:rPr lang="en-US" sz="2400" b="0" i="1" smtClean="0">
+                          <a:latin typeface="Cambria Math" panose="02040503050406030204" pitchFamily="18" charset="0"/>
+                          <a:cs typeface="Times New Roman" panose="02020603050405020304" pitchFamily="18" charset="0"/>
+                        </a:rPr>
+                        <m:t>6</m:t>
                       </m:r>
                       <m:sSub>
                         <m:sSubPr>
@@ -9343,7 +10913,14 @@
                           <a:latin typeface="Cambria Math" panose="02040503050406030204" pitchFamily="18" charset="0"/>
                           <a:cs typeface="Times New Roman" panose="02020603050405020304" pitchFamily="18" charset="0"/>
                         </a:rPr>
-                        <m:t>+3</m:t>
+                        <m:t>+</m:t>
+                      </m:r>
+                      <m:r>
+                        <a:rPr lang="en-US" sz="2400" b="0" i="1" smtClean="0">
+                          <a:latin typeface="Cambria Math" panose="02040503050406030204" pitchFamily="18" charset="0"/>
+                          <a:cs typeface="Times New Roman" panose="02020603050405020304" pitchFamily="18" charset="0"/>
+                        </a:rPr>
+                        <m:t>3</m:t>
                       </m:r>
                       <m:sSub>
                         <m:sSubPr>
@@ -9378,7 +10955,14 @@
                           <a:latin typeface="Cambria Math" panose="02040503050406030204" pitchFamily="18" charset="0"/>
                           <a:cs typeface="Times New Roman" panose="02020603050405020304" pitchFamily="18" charset="0"/>
                         </a:rPr>
-                        <m:t>≤182</m:t>
+                        <m:t>≤</m:t>
+                      </m:r>
+                      <m:r>
+                        <a:rPr lang="en-US" sz="2400" b="0" i="1" smtClean="0">
+                          <a:latin typeface="Cambria Math" panose="02040503050406030204" pitchFamily="18" charset="0"/>
+                          <a:cs typeface="Times New Roman" panose="02020603050405020304" pitchFamily="18" charset="0"/>
+                        </a:rPr>
+                        <m:t>182</m:t>
                       </m:r>
                     </m:oMath>
                   </m:oMathPara>
@@ -9401,25 +10985,39 @@
                       <m:sSub>
                         <m:sSubPr>
                           <m:ctrlPr>
-                            <a:rPr lang="en-US" sz="2400" i="1"/>
+                            <a:rPr lang="en-US" sz="2400" i="1">
+                              <a:latin typeface="Cambria Math" panose="02040503050406030204" pitchFamily="18" charset="0"/>
+                            </a:rPr>
                           </m:ctrlPr>
                         </m:sSubPr>
                         <m:e>
                           <m:r>
-                            <a:rPr lang="en-US" sz="2400" i="1"/>
+                            <a:rPr lang="en-US" sz="2400" i="1">
+                              <a:latin typeface="Cambria Math" panose="02040503050406030204" pitchFamily="18" charset="0"/>
+                            </a:rPr>
                             <m:t>𝑥</m:t>
                           </m:r>
                         </m:e>
                         <m:sub>
                           <m:r>
-                            <a:rPr lang="en-US" sz="2400" i="1"/>
+                            <a:rPr lang="en-US" sz="2400" i="1">
+                              <a:latin typeface="Cambria Math" panose="02040503050406030204" pitchFamily="18" charset="0"/>
+                            </a:rPr>
                             <m:t>1</m:t>
                           </m:r>
                         </m:sub>
                       </m:sSub>
                       <m:r>
-                        <a:rPr lang="en-US" sz="2400" i="1"/>
-                        <m:t>≥0</m:t>
+                        <a:rPr lang="en-US" sz="2400" i="1">
+                          <a:latin typeface="Cambria Math" panose="02040503050406030204" pitchFamily="18" charset="0"/>
+                        </a:rPr>
+                        <m:t>≥</m:t>
+                      </m:r>
+                      <m:r>
+                        <a:rPr lang="en-US" sz="2400" i="1">
+                          <a:latin typeface="Cambria Math" panose="02040503050406030204" pitchFamily="18" charset="0"/>
+                        </a:rPr>
+                        <m:t>0</m:t>
                       </m:r>
                     </m:oMath>
                   </m:oMathPara>
@@ -9443,25 +11041,39 @@
                       <m:sSub>
                         <m:sSubPr>
                           <m:ctrlPr>
-                            <a:rPr lang="en-US" sz="2400" i="1"/>
+                            <a:rPr lang="en-US" sz="2400" i="1">
+                              <a:latin typeface="Cambria Math" panose="02040503050406030204" pitchFamily="18" charset="0"/>
+                            </a:rPr>
                           </m:ctrlPr>
                         </m:sSubPr>
                         <m:e>
                           <m:r>
-                            <a:rPr lang="en-US" sz="2400" i="1"/>
+                            <a:rPr lang="en-US" sz="2400" i="1">
+                              <a:latin typeface="Cambria Math" panose="02040503050406030204" pitchFamily="18" charset="0"/>
+                            </a:rPr>
                             <m:t>𝑥</m:t>
                           </m:r>
                         </m:e>
                         <m:sub>
                           <m:r>
-                            <a:rPr lang="en-US" sz="2400" i="1"/>
+                            <a:rPr lang="en-US" sz="2400" i="1">
+                              <a:latin typeface="Cambria Math" panose="02040503050406030204" pitchFamily="18" charset="0"/>
+                            </a:rPr>
                             <m:t>2</m:t>
                           </m:r>
                         </m:sub>
                       </m:sSub>
                       <m:r>
-                        <a:rPr lang="en-US" sz="2400" i="1"/>
-                        <m:t>≥0</m:t>
+                        <a:rPr lang="en-US" sz="2400" i="1">
+                          <a:latin typeface="Cambria Math" panose="02040503050406030204" pitchFamily="18" charset="0"/>
+                        </a:rPr>
+                        <m:t>≥</m:t>
+                      </m:r>
+                      <m:r>
+                        <a:rPr lang="en-US" sz="2400" i="1">
+                          <a:latin typeface="Cambria Math" panose="02040503050406030204" pitchFamily="18" charset="0"/>
+                        </a:rPr>
+                        <m:t>0</m:t>
                       </m:r>
                     </m:oMath>
                   </m:oMathPara>
@@ -9485,25 +11097,39 @@
                       <m:sSub>
                         <m:sSubPr>
                           <m:ctrlPr>
-                            <a:rPr lang="en-US" sz="2400" i="1"/>
+                            <a:rPr lang="en-US" sz="2400" i="1">
+                              <a:latin typeface="Cambria Math" panose="02040503050406030204" pitchFamily="18" charset="0"/>
+                            </a:rPr>
                           </m:ctrlPr>
                         </m:sSubPr>
                         <m:e>
                           <m:r>
-                            <a:rPr lang="en-US" sz="2400" i="1"/>
+                            <a:rPr lang="en-US" sz="2400" i="1">
+                              <a:latin typeface="Cambria Math" panose="02040503050406030204" pitchFamily="18" charset="0"/>
+                            </a:rPr>
                             <m:t>𝑥</m:t>
                           </m:r>
                         </m:e>
                         <m:sub>
                           <m:r>
-                            <a:rPr lang="en-US" sz="2400" i="1"/>
+                            <a:rPr lang="en-US" sz="2400" i="1">
+                              <a:latin typeface="Cambria Math" panose="02040503050406030204" pitchFamily="18" charset="0"/>
+                            </a:rPr>
                             <m:t>3</m:t>
                           </m:r>
                         </m:sub>
                       </m:sSub>
                       <m:r>
-                        <a:rPr lang="en-US" sz="2400" i="1"/>
-                        <m:t>≥0</m:t>
+                        <a:rPr lang="en-US" sz="2400" i="1">
+                          <a:latin typeface="Cambria Math" panose="02040503050406030204" pitchFamily="18" charset="0"/>
+                        </a:rPr>
+                        <m:t>≥</m:t>
+                      </m:r>
+                      <m:r>
+                        <a:rPr lang="en-US" sz="2400" i="1">
+                          <a:latin typeface="Cambria Math" panose="02040503050406030204" pitchFamily="18" charset="0"/>
+                        </a:rPr>
+                        <m:t>0</m:t>
                       </m:r>
                     </m:oMath>
                   </m:oMathPara>
@@ -9564,7 +11190,23 @@
                         <a:latin typeface="Cambria Math" panose="02040503050406030204" pitchFamily="18" charset="0"/>
                         <a:cs typeface="Times New Roman" panose="02020603050405020304" pitchFamily="18" charset="0"/>
                       </a:rPr>
-                      <m:t>=4, </m:t>
+                      <m:t>=</m:t>
+                    </m:r>
+                    <m:r>
+                      <a:rPr lang="en-US" sz="2400" b="0" i="1" smtClean="0">
+                        <a:effectLst/>
+                        <a:latin typeface="Cambria Math" panose="02040503050406030204" pitchFamily="18" charset="0"/>
+                        <a:cs typeface="Times New Roman" panose="02020603050405020304" pitchFamily="18" charset="0"/>
+                      </a:rPr>
+                      <m:t>4</m:t>
+                    </m:r>
+                    <m:r>
+                      <a:rPr lang="en-US" sz="2400" b="0" i="1" smtClean="0">
+                        <a:effectLst/>
+                        <a:latin typeface="Cambria Math" panose="02040503050406030204" pitchFamily="18" charset="0"/>
+                        <a:cs typeface="Times New Roman" panose="02020603050405020304" pitchFamily="18" charset="0"/>
+                      </a:rPr>
+                      <m:t>, </m:t>
                     </m:r>
                     <m:sSub>
                       <m:sSubPr>
@@ -9603,7 +11245,23 @@
                         <a:latin typeface="Cambria Math" panose="02040503050406030204" pitchFamily="18" charset="0"/>
                         <a:cs typeface="Times New Roman" panose="02020603050405020304" pitchFamily="18" charset="0"/>
                       </a:rPr>
-                      <m:t>=10, </m:t>
+                      <m:t>=</m:t>
+                    </m:r>
+                    <m:r>
+                      <a:rPr lang="en-US" sz="2400" b="0" i="1" smtClean="0">
+                        <a:effectLst/>
+                        <a:latin typeface="Cambria Math" panose="02040503050406030204" pitchFamily="18" charset="0"/>
+                        <a:cs typeface="Times New Roman" panose="02020603050405020304" pitchFamily="18" charset="0"/>
+                      </a:rPr>
+                      <m:t>10</m:t>
+                    </m:r>
+                    <m:r>
+                      <a:rPr lang="en-US" sz="2400" b="0" i="1" smtClean="0">
+                        <a:effectLst/>
+                        <a:latin typeface="Cambria Math" panose="02040503050406030204" pitchFamily="18" charset="0"/>
+                        <a:cs typeface="Times New Roman" panose="02020603050405020304" pitchFamily="18" charset="0"/>
+                      </a:rPr>
+                      <m:t>, </m:t>
                     </m:r>
                     <m:sSub>
                       <m:sSubPr>
@@ -9642,7 +11300,15 @@
                         <a:latin typeface="Cambria Math" panose="02040503050406030204" pitchFamily="18" charset="0"/>
                         <a:cs typeface="Times New Roman" panose="02020603050405020304" pitchFamily="18" charset="0"/>
                       </a:rPr>
-                      <m:t>=14</m:t>
+                      <m:t>=</m:t>
+                    </m:r>
+                    <m:r>
+                      <a:rPr lang="en-US" sz="2400" b="0" i="1" smtClean="0">
+                        <a:effectLst/>
+                        <a:latin typeface="Cambria Math" panose="02040503050406030204" pitchFamily="18" charset="0"/>
+                        <a:cs typeface="Times New Roman" panose="02020603050405020304" pitchFamily="18" charset="0"/>
+                      </a:rPr>
+                      <m:t>14</m:t>
                     </m:r>
                   </m:oMath>
                 </a14:m>
@@ -9667,7 +11333,7 @@
             </p:txBody>
           </p:sp>
         </mc:Choice>
-        <mc:Fallback>
+        <mc:Fallback xmlns="">
           <p:sp>
             <p:nvSpPr>
               <p:cNvPr id="3" name="Content Placeholder 2">
@@ -9724,7 +11390,7 @@
 </p:sld>
 </file>
 
-<file path=ppt/slides/slide18.xml><?xml version="1.0" encoding="utf-8"?>
+<file path=ppt/slides/slide21.xml><?xml version="1.0" encoding="utf-8"?>
 <p:sld xmlns:a="http://schemas.openxmlformats.org/drawingml/2006/main" xmlns:r="http://schemas.openxmlformats.org/officeDocument/2006/relationships" xmlns:p="http://schemas.openxmlformats.org/presentationml/2006/main">
   <p:cSld>
     <p:spTree>
@@ -9772,8 +11438,8 @@
           </a:p>
         </p:txBody>
       </p:sp>
-      <mc:AlternateContent xmlns:mc="http://schemas.openxmlformats.org/markup-compatibility/2006">
-        <mc:Choice xmlns:a14="http://schemas.microsoft.com/office/drawing/2010/main" Requires="a14">
+      <mc:AlternateContent xmlns:mc="http://schemas.openxmlformats.org/markup-compatibility/2006" xmlns:a14="http://schemas.microsoft.com/office/drawing/2010/main">
+        <mc:Choice Requires="a14">
           <p:sp>
             <p:nvSpPr>
               <p:cNvPr id="3" name="Content Placeholder 2">
@@ -9827,7 +11493,7 @@
                     <m:d>
                       <m:dPr>
                         <m:ctrlPr>
-                          <a:rPr lang="en-US" b="0" i="0" smtClean="0">
+                          <a:rPr lang="en-US" b="0" i="1" smtClean="0">
                             <a:latin typeface="Cambria Math" panose="02040503050406030204" pitchFamily="18" charset="0"/>
                             <a:cs typeface="Times New Roman" panose="02020603050405020304" pitchFamily="18" charset="0"/>
                           </a:rPr>
@@ -10234,7 +11900,7 @@
             </p:txBody>
           </p:sp>
         </mc:Choice>
-        <mc:Fallback>
+        <mc:Fallback xmlns="">
           <p:sp>
             <p:nvSpPr>
               <p:cNvPr id="3" name="Content Placeholder 2">
@@ -10287,7 +11953,7 @@
 </p:sld>
 </file>
 
-<file path=ppt/slides/slide19.xml><?xml version="1.0" encoding="utf-8"?>
+<file path=ppt/slides/slide22.xml><?xml version="1.0" encoding="utf-8"?>
 <p:sld xmlns:a="http://schemas.openxmlformats.org/drawingml/2006/main" xmlns:r="http://schemas.openxmlformats.org/officeDocument/2006/relationships" xmlns:p="http://schemas.openxmlformats.org/presentationml/2006/main">
   <p:cSld>
     <p:spTree>
@@ -10356,175 +12022,6 @@
 </p:sld>
 </file>
 
-<file path=ppt/slides/slide2.xml><?xml version="1.0" encoding="utf-8"?>
-<p:sld xmlns:a="http://schemas.openxmlformats.org/drawingml/2006/main" xmlns:r="http://schemas.openxmlformats.org/officeDocument/2006/relationships" xmlns:p="http://schemas.openxmlformats.org/presentationml/2006/main">
-  <p:cSld>
-    <p:spTree>
-      <p:nvGrpSpPr>
-        <p:cNvPr id="1" name=""/>
-        <p:cNvGrpSpPr/>
-        <p:nvPr/>
-      </p:nvGrpSpPr>
-      <p:grpSpPr>
-        <a:xfrm>
-          <a:off x="0" y="0"/>
-          <a:ext cx="0" cy="0"/>
-          <a:chOff x="0" y="0"/>
-          <a:chExt cx="0" cy="0"/>
-        </a:xfrm>
-      </p:grpSpPr>
-      <p:sp>
-        <p:nvSpPr>
-          <p:cNvPr id="2" name="Title 1">
-            <a:extLst>
-              <a:ext uri="{FF2B5EF4-FFF2-40B4-BE49-F238E27FC236}">
-                <a16:creationId xmlns:a16="http://schemas.microsoft.com/office/drawing/2014/main" id="{907C41F1-9BA1-4A58-B862-A9BF39036532}"/>
-              </a:ext>
-            </a:extLst>
-          </p:cNvPr>
-          <p:cNvSpPr>
-            <a:spLocks noGrp="1"/>
-          </p:cNvSpPr>
-          <p:nvPr>
-            <p:ph type="title"/>
-          </p:nvPr>
-        </p:nvSpPr>
-        <p:spPr>
-          <a:xfrm>
-            <a:off x="838200" y="365125"/>
-            <a:ext cx="10515600" cy="594099"/>
-          </a:xfrm>
-        </p:spPr>
-        <p:txBody>
-          <a:bodyPr>
-            <a:normAutofit fontScale="90000"/>
-          </a:bodyPr>
-          <a:lstStyle/>
-          <a:p>
-            <a:r>
-              <a:rPr lang="en-US" dirty="0">
-                <a:latin typeface="Times New Roman" panose="02020603050405020304" pitchFamily="18" charset="0"/>
-                <a:cs typeface="Times New Roman" panose="02020603050405020304" pitchFamily="18" charset="0"/>
-              </a:rPr>
-              <a:t>Introduction</a:t>
-            </a:r>
-          </a:p>
-        </p:txBody>
-      </p:sp>
-      <p:sp>
-        <p:nvSpPr>
-          <p:cNvPr id="3" name="Content Placeholder 2">
-            <a:extLst>
-              <a:ext uri="{FF2B5EF4-FFF2-40B4-BE49-F238E27FC236}">
-                <a16:creationId xmlns:a16="http://schemas.microsoft.com/office/drawing/2014/main" id="{09FA02AA-5E7F-412B-9A2D-840CC00BBBE4}"/>
-              </a:ext>
-            </a:extLst>
-          </p:cNvPr>
-          <p:cNvSpPr>
-            <a:spLocks noGrp="1"/>
-          </p:cNvSpPr>
-          <p:nvPr>
-            <p:ph idx="1"/>
-          </p:nvPr>
-        </p:nvSpPr>
-        <p:spPr>
-          <a:xfrm>
-            <a:off x="838200" y="1102659"/>
-            <a:ext cx="10515600" cy="5074304"/>
-          </a:xfrm>
-        </p:spPr>
-        <p:txBody>
-          <a:bodyPr>
-            <a:normAutofit/>
-          </a:bodyPr>
-          <a:lstStyle/>
-          <a:p>
-            <a:pPr marL="0" indent="0">
-              <a:buNone/>
-            </a:pPr>
-            <a:r>
-              <a:rPr lang="en-US" sz="2400" dirty="0">
-                <a:latin typeface="Times New Roman" panose="02020603050405020304" pitchFamily="18" charset="0"/>
-                <a:cs typeface="Times New Roman" panose="02020603050405020304" pitchFamily="18" charset="0"/>
-              </a:rPr>
-              <a:t>In the real world, we often encounter problems that require minimizing or maximizing a certain value according to some constraints. </a:t>
-            </a:r>
-          </a:p>
-          <a:p>
-            <a:pPr marL="0" indent="0">
-              <a:buNone/>
-            </a:pPr>
-            <a:r>
-              <a:rPr lang="en-US" sz="2400" dirty="0">
-                <a:latin typeface="Times New Roman" panose="02020603050405020304" pitchFamily="18" charset="0"/>
-                <a:cs typeface="Times New Roman" panose="02020603050405020304" pitchFamily="18" charset="0"/>
-              </a:rPr>
-              <a:t>These problems are given as statements that include some information about what it is required to achieve and what constraints are imposed. </a:t>
-            </a:r>
-          </a:p>
-          <a:p>
-            <a:pPr marL="0" indent="0">
-              <a:buNone/>
-            </a:pPr>
-            <a:r>
-              <a:rPr lang="en-US" sz="2400" dirty="0">
-                <a:latin typeface="Times New Roman" panose="02020603050405020304" pitchFamily="18" charset="0"/>
-                <a:cs typeface="Times New Roman" panose="02020603050405020304" pitchFamily="18" charset="0"/>
-              </a:rPr>
-              <a:t>To turn these English expressions into Mathematical expressions, we can follow these general steps:  </a:t>
-            </a:r>
-          </a:p>
-          <a:p>
-            <a:pPr marL="457200" indent="-457200">
-              <a:buAutoNum type="arabicPeriod"/>
-            </a:pPr>
-            <a:r>
-              <a:rPr lang="en-US" sz="2400" dirty="0">
-                <a:latin typeface="Times New Roman" panose="02020603050405020304" pitchFamily="18" charset="0"/>
-                <a:cs typeface="Times New Roman" panose="02020603050405020304" pitchFamily="18" charset="0"/>
-              </a:rPr>
-              <a:t>Identify the goal of the problem, which is called “the objective function”. What do we want to maximize or minimize?</a:t>
-            </a:r>
-          </a:p>
-          <a:p>
-            <a:pPr marL="457200" indent="-457200">
-              <a:buAutoNum type="arabicPeriod"/>
-            </a:pPr>
-            <a:r>
-              <a:rPr lang="en-US" sz="2400" dirty="0">
-                <a:latin typeface="Times New Roman" panose="02020603050405020304" pitchFamily="18" charset="0"/>
-                <a:cs typeface="Times New Roman" panose="02020603050405020304" pitchFamily="18" charset="0"/>
-              </a:rPr>
-              <a:t>Search for the constraints imposed on the objective function. What should be done while minimizing or maximizing the objective function?</a:t>
-            </a:r>
-          </a:p>
-          <a:p>
-            <a:pPr marL="457200" indent="-457200">
-              <a:buAutoNum type="arabicPeriod"/>
-            </a:pPr>
-            <a:r>
-              <a:rPr lang="en-US" sz="2400" dirty="0">
-                <a:latin typeface="Times New Roman" panose="02020603050405020304" pitchFamily="18" charset="0"/>
-                <a:cs typeface="Times New Roman" panose="02020603050405020304" pitchFamily="18" charset="0"/>
-              </a:rPr>
-              <a:t>Search for statements that tell you about the boundaries of each variable of the objective function. Are the variables required to be only positive, only negative, or should fall within a specific range?</a:t>
-            </a:r>
-          </a:p>
-        </p:txBody>
-      </p:sp>
-    </p:spTree>
-    <p:extLst>
-      <p:ext uri="{BB962C8B-B14F-4D97-AF65-F5344CB8AC3E}">
-        <p14:creationId xmlns:p14="http://schemas.microsoft.com/office/powerpoint/2010/main" val="3267437923"/>
-      </p:ext>
-    </p:extLst>
-  </p:cSld>
-  <p:clrMapOvr>
-    <a:masterClrMapping/>
-  </p:clrMapOvr>
-</p:sld>
-</file>
-
 <file path=ppt/slides/slide3.xml><?xml version="1.0" encoding="utf-8"?>
 <p:sld xmlns:a="http://schemas.openxmlformats.org/drawingml/2006/main" xmlns:r="http://schemas.openxmlformats.org/officeDocument/2006/relationships" xmlns:p="http://schemas.openxmlformats.org/presentationml/2006/main">
   <p:cSld>
@@ -10573,8 +12070,8 @@
           </a:p>
         </p:txBody>
       </p:sp>
-      <mc:AlternateContent xmlns:mc="http://schemas.openxmlformats.org/markup-compatibility/2006">
-        <mc:Choice xmlns:a14="http://schemas.microsoft.com/office/drawing/2010/main" Requires="a14">
+      <mc:AlternateContent xmlns:mc="http://schemas.openxmlformats.org/markup-compatibility/2006" xmlns:a14="http://schemas.microsoft.com/office/drawing/2010/main">
+        <mc:Choice Requires="a14">
           <p:sp>
             <p:nvSpPr>
               <p:cNvPr id="3" name="Content Placeholder 2">
@@ -10854,7 +12351,7 @@
             </p:txBody>
           </p:sp>
         </mc:Choice>
-        <mc:Fallback>
+        <mc:Fallback xmlns="">
           <p:sp>
             <p:nvSpPr>
               <p:cNvPr id="3" name="Content Placeholder 2">
@@ -10955,8 +12452,8 @@
           </a:p>
         </p:txBody>
       </p:sp>
-      <mc:AlternateContent xmlns:mc="http://schemas.openxmlformats.org/markup-compatibility/2006">
-        <mc:Choice xmlns:a14="http://schemas.microsoft.com/office/drawing/2010/main" Requires="a14">
+      <mc:AlternateContent xmlns:mc="http://schemas.openxmlformats.org/markup-compatibility/2006" xmlns:a14="http://schemas.microsoft.com/office/drawing/2010/main">
+        <mc:Choice Requires="a14">
           <p:sp>
             <p:nvSpPr>
               <p:cNvPr id="3" name="Content Placeholder 2">
@@ -11090,13 +12587,7 @@
                         <a:rPr lang="en-US" sz="2400" b="0" i="1" smtClean="0">
                           <a:latin typeface="Cambria Math" panose="02040503050406030204" pitchFamily="18" charset="0"/>
                         </a:rPr>
-                        <m:t>=</m:t>
-                      </m:r>
-                      <m:r>
-                        <a:rPr lang="en-US" sz="2400" b="0" i="1" smtClean="0">
-                          <a:latin typeface="Cambria Math" panose="02040503050406030204" pitchFamily="18" charset="0"/>
-                        </a:rPr>
-                        <m:t>30</m:t>
+                        <m:t>=30</m:t>
                       </m:r>
                       <m:sSub>
                         <m:sSubPr>
@@ -11127,13 +12618,7 @@
                         <a:rPr lang="en-US" sz="2400" b="0" i="1" smtClean="0">
                           <a:latin typeface="Cambria Math" panose="02040503050406030204" pitchFamily="18" charset="0"/>
                         </a:rPr>
-                        <m:t>+</m:t>
-                      </m:r>
-                      <m:r>
-                        <a:rPr lang="en-US" sz="2400" b="0" i="1" smtClean="0">
-                          <a:latin typeface="Cambria Math" panose="02040503050406030204" pitchFamily="18" charset="0"/>
-                        </a:rPr>
-                        <m:t>40</m:t>
+                        <m:t>+40</m:t>
                       </m:r>
                       <m:sSub>
                         <m:sSubPr>
@@ -11407,7 +12892,7 @@
             </p:txBody>
           </p:sp>
         </mc:Choice>
-        <mc:Fallback>
+        <mc:Fallback xmlns="">
           <p:sp>
             <p:nvSpPr>
               <p:cNvPr id="3" name="Content Placeholder 2">
@@ -11881,7 +13366,13 @@
                         <a:rPr lang="en-US" b="0" i="1" smtClean="0">
                           <a:latin typeface="Cambria Math" panose="02040503050406030204" pitchFamily="18" charset="0"/>
                         </a:rPr>
-                        <m:t>=3000</m:t>
+                        <m:t>=</m:t>
+                      </m:r>
+                      <m:r>
+                        <a:rPr lang="en-US" b="0" i="1" smtClean="0">
+                          <a:latin typeface="Cambria Math" panose="02040503050406030204" pitchFamily="18" charset="0"/>
+                        </a:rPr>
+                        <m:t>3000</m:t>
                       </m:r>
                     </m:oMath>
                   </m:oMathPara>
@@ -12158,7 +13649,13 @@
                         <a:rPr lang="en-US" b="0" i="1" smtClean="0">
                           <a:latin typeface="Cambria Math" panose="02040503050406030204" pitchFamily="18" charset="0"/>
                         </a:rPr>
-                        <m:t>+30</m:t>
+                        <m:t>+</m:t>
+                      </m:r>
+                      <m:r>
+                        <a:rPr lang="en-US" b="0" i="1" smtClean="0">
+                          <a:latin typeface="Cambria Math" panose="02040503050406030204" pitchFamily="18" charset="0"/>
+                        </a:rPr>
+                        <m:t>30</m:t>
                       </m:r>
                       <m:sSub>
                         <m:sSubPr>
@@ -12189,7 +13686,13 @@
                         <a:rPr lang="en-US" b="0" i="1" smtClean="0">
                           <a:latin typeface="Cambria Math" panose="02040503050406030204" pitchFamily="18" charset="0"/>
                         </a:rPr>
-                        <m:t>=4000</m:t>
+                        <m:t>=</m:t>
+                      </m:r>
+                      <m:r>
+                        <a:rPr lang="en-US" b="0" i="1" smtClean="0">
+                          <a:latin typeface="Cambria Math" panose="02040503050406030204" pitchFamily="18" charset="0"/>
+                        </a:rPr>
+                        <m:t>4000</m:t>
                       </m:r>
                     </m:oMath>
                   </m:oMathPara>
@@ -12254,7 +13757,14 @@
                           <a:latin typeface="Cambria Math" panose="02040503050406030204" pitchFamily="18" charset="0"/>
                           <a:cs typeface="Times New Roman" panose="02020603050405020304" pitchFamily="18" charset="0"/>
                         </a:rPr>
-                        <m:t>≥0</m:t>
+                        <m:t>≥</m:t>
+                      </m:r>
+                      <m:r>
+                        <a:rPr lang="en-US" b="0" i="1" smtClean="0">
+                          <a:latin typeface="Cambria Math" panose="02040503050406030204" pitchFamily="18" charset="0"/>
+                          <a:cs typeface="Times New Roman" panose="02020603050405020304" pitchFamily="18" charset="0"/>
+                        </a:rPr>
+                        <m:t>0</m:t>
                       </m:r>
                     </m:oMath>
                   </m:oMathPara>
@@ -12307,7 +13817,14 @@
                           <a:latin typeface="Cambria Math" panose="02040503050406030204" pitchFamily="18" charset="0"/>
                           <a:cs typeface="Times New Roman" panose="02020603050405020304" pitchFamily="18" charset="0"/>
                         </a:rPr>
-                        <m:t>≥0</m:t>
+                        <m:t>≥</m:t>
+                      </m:r>
+                      <m:r>
+                        <a:rPr lang="en-US" b="0" i="1" smtClean="0">
+                          <a:latin typeface="Cambria Math" panose="02040503050406030204" pitchFamily="18" charset="0"/>
+                          <a:cs typeface="Times New Roman" panose="02020603050405020304" pitchFamily="18" charset="0"/>
+                        </a:rPr>
+                        <m:t>0</m:t>
                       </m:r>
                     </m:oMath>
                   </m:oMathPara>
@@ -12585,7 +14102,14 @@
                           <a:latin typeface="Cambria Math" panose="02040503050406030204" pitchFamily="18" charset="0"/>
                           <a:cs typeface="Times New Roman" panose="02020603050405020304" pitchFamily="18" charset="0"/>
                         </a:rPr>
-                        <m:t>=30</m:t>
+                        <m:t>=</m:t>
+                      </m:r>
+                      <m:r>
+                        <a:rPr lang="en-US" sz="2400" b="0" i="1" smtClean="0">
+                          <a:latin typeface="Cambria Math" panose="02040503050406030204" pitchFamily="18" charset="0"/>
+                          <a:cs typeface="Times New Roman" panose="02020603050405020304" pitchFamily="18" charset="0"/>
+                        </a:rPr>
+                        <m:t>30</m:t>
                       </m:r>
                       <m:sSub>
                         <m:sSubPr>
@@ -12620,7 +14144,14 @@
                           <a:latin typeface="Cambria Math" panose="02040503050406030204" pitchFamily="18" charset="0"/>
                           <a:cs typeface="Times New Roman" panose="02020603050405020304" pitchFamily="18" charset="0"/>
                         </a:rPr>
-                        <m:t>+40</m:t>
+                        <m:t>+</m:t>
+                      </m:r>
+                      <m:r>
+                        <a:rPr lang="en-US" sz="2400" b="0" i="1" smtClean="0">
+                          <a:latin typeface="Cambria Math" panose="02040503050406030204" pitchFamily="18" charset="0"/>
+                          <a:cs typeface="Times New Roman" panose="02020603050405020304" pitchFamily="18" charset="0"/>
+                        </a:rPr>
+                        <m:t>40</m:t>
                       </m:r>
                       <m:sSub>
                         <m:sSubPr>
@@ -12715,7 +14246,13 @@
                         <a:rPr lang="en-US" sz="2400" i="1">
                           <a:latin typeface="Cambria Math" panose="02040503050406030204" pitchFamily="18" charset="0"/>
                         </a:rPr>
-                        <m:t>+30</m:t>
+                        <m:t>+</m:t>
+                      </m:r>
+                      <m:r>
+                        <a:rPr lang="en-US" sz="2400" i="1">
+                          <a:latin typeface="Cambria Math" panose="02040503050406030204" pitchFamily="18" charset="0"/>
+                        </a:rPr>
+                        <m:t>30</m:t>
                       </m:r>
                       <m:sSub>
                         <m:sSubPr>
@@ -12752,7 +14289,13 @@
                         <a:rPr lang="en-US" sz="2400" i="1">
                           <a:latin typeface="Cambria Math" panose="02040503050406030204" pitchFamily="18" charset="0"/>
                         </a:rPr>
-                        <m:t>3000</m:t>
+                        <m:t>300</m:t>
+                      </m:r>
+                      <m:r>
+                        <a:rPr lang="en-US" sz="2400" b="0" i="1" smtClean="0">
+                          <a:latin typeface="Cambria Math" panose="02040503050406030204" pitchFamily="18" charset="0"/>
+                        </a:rPr>
+                        <m:t>0</m:t>
                       </m:r>
                     </m:oMath>
                   </m:oMathPara>
@@ -12807,7 +14350,13 @@
                         <a:rPr lang="en-US" sz="2400" i="1">
                           <a:latin typeface="Cambria Math" panose="02040503050406030204" pitchFamily="18" charset="0"/>
                         </a:rPr>
-                        <m:t>+30</m:t>
+                        <m:t>+</m:t>
+                      </m:r>
+                      <m:r>
+                        <a:rPr lang="en-US" sz="2400" i="1">
+                          <a:latin typeface="Cambria Math" panose="02040503050406030204" pitchFamily="18" charset="0"/>
+                        </a:rPr>
+                        <m:t>30</m:t>
                       </m:r>
                       <m:sSub>
                         <m:sSubPr>
@@ -12897,7 +14446,14 @@
                           <a:latin typeface="Cambria Math" panose="02040503050406030204" pitchFamily="18" charset="0"/>
                           <a:cs typeface="Times New Roman" panose="02020603050405020304" pitchFamily="18" charset="0"/>
                         </a:rPr>
-                        <m:t>≥0</m:t>
+                        <m:t>≥</m:t>
+                      </m:r>
+                      <m:r>
+                        <a:rPr lang="en-US" sz="2400" i="1">
+                          <a:latin typeface="Cambria Math" panose="02040503050406030204" pitchFamily="18" charset="0"/>
+                          <a:cs typeface="Times New Roman" panose="02020603050405020304" pitchFamily="18" charset="0"/>
+                        </a:rPr>
+                        <m:t>0</m:t>
                       </m:r>
                     </m:oMath>
                   </m:oMathPara>
@@ -12950,7 +14506,14 @@
                           <a:latin typeface="Cambria Math" panose="02040503050406030204" pitchFamily="18" charset="0"/>
                           <a:cs typeface="Times New Roman" panose="02020603050405020304" pitchFamily="18" charset="0"/>
                         </a:rPr>
-                        <m:t>≥0</m:t>
+                        <m:t>≥</m:t>
+                      </m:r>
+                      <m:r>
+                        <a:rPr lang="en-US" sz="2400" i="1">
+                          <a:latin typeface="Cambria Math" panose="02040503050406030204" pitchFamily="18" charset="0"/>
+                          <a:cs typeface="Times New Roman" panose="02020603050405020304" pitchFamily="18" charset="0"/>
+                        </a:rPr>
+                        <m:t>0</m:t>
                       </m:r>
                     </m:oMath>
                   </m:oMathPara>
@@ -13015,7 +14578,21 @@
                           <a:latin typeface="Cambria Math" panose="02040503050406030204" pitchFamily="18" charset="0"/>
                           <a:cs typeface="Times New Roman" panose="02020603050405020304" pitchFamily="18" charset="0"/>
                         </a:rPr>
-                        <m:t>=51, </m:t>
+                        <m:t>=</m:t>
+                      </m:r>
+                      <m:r>
+                        <a:rPr lang="en-US" sz="2400" b="0" i="1" smtClean="0">
+                          <a:latin typeface="Cambria Math" panose="02040503050406030204" pitchFamily="18" charset="0"/>
+                          <a:cs typeface="Times New Roman" panose="02020603050405020304" pitchFamily="18" charset="0"/>
+                        </a:rPr>
+                        <m:t>51</m:t>
+                      </m:r>
+                      <m:r>
+                        <a:rPr lang="en-US" sz="2400" b="0" i="1" smtClean="0">
+                          <a:latin typeface="Cambria Math" panose="02040503050406030204" pitchFamily="18" charset="0"/>
+                          <a:cs typeface="Times New Roman" panose="02020603050405020304" pitchFamily="18" charset="0"/>
+                        </a:rPr>
+                        <m:t>, </m:t>
                       </m:r>
                       <m:sSub>
                         <m:sSubPr>
@@ -13050,7 +14627,14 @@
                           <a:latin typeface="Cambria Math" panose="02040503050406030204" pitchFamily="18" charset="0"/>
                           <a:cs typeface="Times New Roman" panose="02020603050405020304" pitchFamily="18" charset="0"/>
                         </a:rPr>
-                        <m:t>=66</m:t>
+                        <m:t>=</m:t>
+                      </m:r>
+                      <m:r>
+                        <a:rPr lang="en-US" sz="2400" b="0" i="1" smtClean="0">
+                          <a:latin typeface="Cambria Math" panose="02040503050406030204" pitchFamily="18" charset="0"/>
+                          <a:cs typeface="Times New Roman" panose="02020603050405020304" pitchFamily="18" charset="0"/>
+                        </a:rPr>
+                        <m:t>66</m:t>
                       </m:r>
                     </m:oMath>
                   </m:oMathPara>
@@ -13589,7 +15173,7 @@
                     <a:latin typeface="Times New Roman" panose="02020603050405020304" pitchFamily="18" charset="0"/>
                     <a:cs typeface="Times New Roman" panose="02020603050405020304" pitchFamily="18" charset="0"/>
                   </a:rPr>
-                  <a:t>It is clear from the statement “Use the simplex method to find the number of liters of each drink that should be produced in order to maximize the profit” that the objective is to maximize the profit. Since the profit per liter for the first and second drinks are $0.60 and $0.50, respectively, the objective function is:</a:t>
+                  <a:t>It is clear from the statement “Use the simplex method to find the number of liters of each drink that should be produced in order to maximize the profit” that the objective is to maximize the profit. Since the profits per liter for the first and second drinks are $0.60 and $0.50, respectively, the objective function is:</a:t>
                 </a:r>
               </a:p>
               <a:p>
@@ -13689,28 +15273,7 @@
                           <a:latin typeface="Cambria Math" panose="02040503050406030204" pitchFamily="18" charset="0"/>
                           <a:cs typeface="Times New Roman" panose="02020603050405020304" pitchFamily="18" charset="0"/>
                         </a:rPr>
-                        <m:t>=</m:t>
-                      </m:r>
-                      <m:r>
-                        <a:rPr lang="en-US" b="0" i="1" smtClean="0">
-                          <a:latin typeface="Cambria Math" panose="02040503050406030204" pitchFamily="18" charset="0"/>
-                          <a:cs typeface="Times New Roman" panose="02020603050405020304" pitchFamily="18" charset="0"/>
-                        </a:rPr>
-                        <m:t>0</m:t>
-                      </m:r>
-                      <m:r>
-                        <a:rPr lang="en-US" b="0" i="1" smtClean="0">
-                          <a:latin typeface="Cambria Math" panose="02040503050406030204" pitchFamily="18" charset="0"/>
-                          <a:cs typeface="Times New Roman" panose="02020603050405020304" pitchFamily="18" charset="0"/>
-                        </a:rPr>
-                        <m:t>.</m:t>
-                      </m:r>
-                      <m:r>
-                        <a:rPr lang="en-US" b="0" i="1" smtClean="0">
-                          <a:latin typeface="Cambria Math" panose="02040503050406030204" pitchFamily="18" charset="0"/>
-                          <a:cs typeface="Times New Roman" panose="02020603050405020304" pitchFamily="18" charset="0"/>
-                        </a:rPr>
-                        <m:t>6</m:t>
+                        <m:t>=0.6</m:t>
                       </m:r>
                       <m:sSub>
                         <m:sSubPr>
@@ -13745,28 +15308,7 @@
                           <a:latin typeface="Cambria Math" panose="02040503050406030204" pitchFamily="18" charset="0"/>
                           <a:cs typeface="Times New Roman" panose="02020603050405020304" pitchFamily="18" charset="0"/>
                         </a:rPr>
-                        <m:t>+</m:t>
-                      </m:r>
-                      <m:r>
-                        <a:rPr lang="en-US" b="0" i="1" smtClean="0">
-                          <a:latin typeface="Cambria Math" panose="02040503050406030204" pitchFamily="18" charset="0"/>
-                          <a:cs typeface="Times New Roman" panose="02020603050405020304" pitchFamily="18" charset="0"/>
-                        </a:rPr>
-                        <m:t>0</m:t>
-                      </m:r>
-                      <m:r>
-                        <a:rPr lang="en-US" b="0" i="1" smtClean="0">
-                          <a:latin typeface="Cambria Math" panose="02040503050406030204" pitchFamily="18" charset="0"/>
-                          <a:cs typeface="Times New Roman" panose="02020603050405020304" pitchFamily="18" charset="0"/>
-                        </a:rPr>
-                        <m:t>.</m:t>
-                      </m:r>
-                      <m:r>
-                        <a:rPr lang="en-US" b="0" i="1" smtClean="0">
-                          <a:latin typeface="Cambria Math" panose="02040503050406030204" pitchFamily="18" charset="0"/>
-                          <a:cs typeface="Times New Roman" panose="02020603050405020304" pitchFamily="18" charset="0"/>
-                        </a:rPr>
-                        <m:t>5</m:t>
+                        <m:t>+0.5</m:t>
                       </m:r>
                       <m:sSub>
                         <m:sSubPr>
@@ -13922,21 +15464,7 @@
                           <a:latin typeface="Cambria Math" panose="02040503050406030204" pitchFamily="18" charset="0"/>
                           <a:cs typeface="Times New Roman" panose="02020603050405020304" pitchFamily="18" charset="0"/>
                         </a:rPr>
-                        <m:t>𝑡</m:t>
-                      </m:r>
-                      <m:r>
-                        <a:rPr lang="en-US" sz="2400" b="0" i="1" smtClean="0">
-                          <a:latin typeface="Cambria Math" panose="02040503050406030204" pitchFamily="18" charset="0"/>
-                          <a:cs typeface="Times New Roman" panose="02020603050405020304" pitchFamily="18" charset="0"/>
-                        </a:rPr>
-                        <m:t>h</m:t>
-                      </m:r>
-                      <m:r>
-                        <a:rPr lang="en-US" sz="2400" b="0" i="1" smtClean="0">
-                          <a:latin typeface="Cambria Math" panose="02040503050406030204" pitchFamily="18" charset="0"/>
-                          <a:cs typeface="Times New Roman" panose="02020603050405020304" pitchFamily="18" charset="0"/>
-                        </a:rPr>
-                        <m:t>𝑒</m:t>
+                        <m:t>𝑡h𝑒</m:t>
                       </m:r>
                       <m:r>
                         <a:rPr lang="en-US" sz="2400" b="0" i="1" smtClean="0">
@@ -14080,21 +15608,7 @@
                           <a:latin typeface="Cambria Math" panose="02040503050406030204" pitchFamily="18" charset="0"/>
                           <a:cs typeface="Times New Roman" panose="02020603050405020304" pitchFamily="18" charset="0"/>
                         </a:rPr>
-                        <m:t>𝑡</m:t>
-                      </m:r>
-                      <m:r>
-                        <a:rPr lang="en-US" sz="2400" b="0" i="1" smtClean="0">
-                          <a:latin typeface="Cambria Math" panose="02040503050406030204" pitchFamily="18" charset="0"/>
-                          <a:cs typeface="Times New Roman" panose="02020603050405020304" pitchFamily="18" charset="0"/>
-                        </a:rPr>
-                        <m:t>h</m:t>
-                      </m:r>
-                      <m:r>
-                        <a:rPr lang="en-US" sz="2400" b="0" i="1" smtClean="0">
-                          <a:latin typeface="Cambria Math" panose="02040503050406030204" pitchFamily="18" charset="0"/>
-                          <a:cs typeface="Times New Roman" panose="02020603050405020304" pitchFamily="18" charset="0"/>
-                        </a:rPr>
-                        <m:t>𝑒</m:t>
+                        <m:t>𝑡h𝑒</m:t>
                       </m:r>
                       <m:r>
                         <a:rPr lang="en-US" sz="2400" b="0" i="1" smtClean="0">

</xml_diff>